<commit_message>
Daten für ES Demo
</commit_message>
<xml_diff>
--- a/workshop-slides/1-vorbereitung/workshop-1.pptx
+++ b/workshop-slides/1-vorbereitung/workshop-1.pptx
@@ -4,20 +4,26 @@
   <p:sldMasterIdLst>
     <p:sldMasterId id="2147483648" r:id="rId1"/>
   </p:sldMasterIdLst>
+  <p:notesMasterIdLst>
+    <p:notesMasterId r:id="rId18"/>
+  </p:notesMasterIdLst>
   <p:sldIdLst>
     <p:sldId id="256" r:id="rId2"/>
     <p:sldId id="257" r:id="rId3"/>
-    <p:sldId id="259" r:id="rId4"/>
-    <p:sldId id="264" r:id="rId5"/>
-    <p:sldId id="258" r:id="rId6"/>
-    <p:sldId id="260" r:id="rId7"/>
-    <p:sldId id="261" r:id="rId8"/>
-    <p:sldId id="262" r:id="rId9"/>
-    <p:sldId id="263" r:id="rId10"/>
-    <p:sldId id="265" r:id="rId11"/>
-    <p:sldId id="267" r:id="rId12"/>
+    <p:sldId id="258" r:id="rId4"/>
+    <p:sldId id="260" r:id="rId5"/>
+    <p:sldId id="261" r:id="rId6"/>
+    <p:sldId id="259" r:id="rId7"/>
+    <p:sldId id="264" r:id="rId8"/>
+    <p:sldId id="267" r:id="rId9"/>
+    <p:sldId id="265" r:id="rId10"/>
+    <p:sldId id="271" r:id="rId11"/>
+    <p:sldId id="263" r:id="rId12"/>
     <p:sldId id="266" r:id="rId13"/>
-    <p:sldId id="268" r:id="rId14"/>
+    <p:sldId id="270" r:id="rId14"/>
+    <p:sldId id="269" r:id="rId15"/>
+    <p:sldId id="262" r:id="rId16"/>
+    <p:sldId id="268" r:id="rId17"/>
   </p:sldIdLst>
   <p:sldSz cx="12192000" cy="6858000"/>
   <p:notesSz cx="6858000" cy="9144000"/>
@@ -116,7 +122,446 @@
       </a:defRPr>
     </a:lvl9pPr>
   </p:defaultTextStyle>
+  <p:extLst>
+    <p:ext uri="{EFAFB233-063F-42B5-8137-9DF3F51BA10A}">
+      <p15:sldGuideLst xmlns:p15="http://schemas.microsoft.com/office/powerpoint/2012/main"/>
+    </p:ext>
+  </p:extLst>
 </p:presentation>
+</file>
+
+<file path=ppt/notesMasters/notesMaster1.xml><?xml version="1.0" encoding="utf-8"?>
+<p:notesMaster xmlns:a="http://schemas.openxmlformats.org/drawingml/2006/main" xmlns:r="http://schemas.openxmlformats.org/officeDocument/2006/relationships" xmlns:p="http://schemas.openxmlformats.org/presentationml/2006/main">
+  <p:cSld>
+    <p:bg>
+      <p:bgRef idx="1001">
+        <a:schemeClr val="bg1"/>
+      </p:bgRef>
+    </p:bg>
+    <p:spTree>
+      <p:nvGrpSpPr>
+        <p:cNvPr id="1" name=""/>
+        <p:cNvGrpSpPr/>
+        <p:nvPr/>
+      </p:nvGrpSpPr>
+      <p:grpSpPr>
+        <a:xfrm>
+          <a:off x="0" y="0"/>
+          <a:ext cx="0" cy="0"/>
+          <a:chOff x="0" y="0"/>
+          <a:chExt cx="0" cy="0"/>
+        </a:xfrm>
+      </p:grpSpPr>
+      <p:sp>
+        <p:nvSpPr>
+          <p:cNvPr id="2" name="Kopfzeilenplatzhalter 1"/>
+          <p:cNvSpPr>
+            <a:spLocks noGrp="1"/>
+          </p:cNvSpPr>
+          <p:nvPr>
+            <p:ph type="hdr" sz="quarter"/>
+          </p:nvPr>
+        </p:nvSpPr>
+        <p:spPr>
+          <a:xfrm>
+            <a:off x="0" y="0"/>
+            <a:ext cx="2971800" cy="458788"/>
+          </a:xfrm>
+          <a:prstGeom prst="rect">
+            <a:avLst/>
+          </a:prstGeom>
+        </p:spPr>
+        <p:txBody>
+          <a:bodyPr vert="horz" lIns="91440" tIns="45720" rIns="91440" bIns="45720" rtlCol="0"/>
+          <a:lstStyle>
+            <a:lvl1pPr algn="l">
+              <a:defRPr sz="1200"/>
+            </a:lvl1pPr>
+          </a:lstStyle>
+          <a:p>
+            <a:endParaRPr lang="de-DE"/>
+          </a:p>
+        </p:txBody>
+      </p:sp>
+      <p:sp>
+        <p:nvSpPr>
+          <p:cNvPr id="3" name="Datumsplatzhalter 2"/>
+          <p:cNvSpPr>
+            <a:spLocks noGrp="1"/>
+          </p:cNvSpPr>
+          <p:nvPr>
+            <p:ph type="dt" idx="1"/>
+          </p:nvPr>
+        </p:nvSpPr>
+        <p:spPr>
+          <a:xfrm>
+            <a:off x="3884613" y="0"/>
+            <a:ext cx="2971800" cy="458788"/>
+          </a:xfrm>
+          <a:prstGeom prst="rect">
+            <a:avLst/>
+          </a:prstGeom>
+        </p:spPr>
+        <p:txBody>
+          <a:bodyPr vert="horz" lIns="91440" tIns="45720" rIns="91440" bIns="45720" rtlCol="0"/>
+          <a:lstStyle>
+            <a:lvl1pPr algn="r">
+              <a:defRPr sz="1200"/>
+            </a:lvl1pPr>
+          </a:lstStyle>
+          <a:p>
+            <a:fld id="{71D38497-73DA-4D4C-B6C2-9066DDEF2A0D}" type="datetimeFigureOut">
+              <a:rPr lang="de-DE" smtClean="0"/>
+              <a:t>23.07.2018</a:t>
+            </a:fld>
+            <a:endParaRPr lang="de-DE"/>
+          </a:p>
+        </p:txBody>
+      </p:sp>
+      <p:sp>
+        <p:nvSpPr>
+          <p:cNvPr id="4" name="Folienbildplatzhalter 3"/>
+          <p:cNvSpPr>
+            <a:spLocks noGrp="1" noRot="1" noChangeAspect="1"/>
+          </p:cNvSpPr>
+          <p:nvPr>
+            <p:ph type="sldImg" idx="2"/>
+          </p:nvPr>
+        </p:nvSpPr>
+        <p:spPr>
+          <a:xfrm>
+            <a:off x="685800" y="1143000"/>
+            <a:ext cx="5486400" cy="3086100"/>
+          </a:xfrm>
+          <a:prstGeom prst="rect">
+            <a:avLst/>
+          </a:prstGeom>
+          <a:noFill/>
+          <a:ln w="12700">
+            <a:solidFill>
+              <a:prstClr val="black"/>
+            </a:solidFill>
+          </a:ln>
+        </p:spPr>
+        <p:txBody>
+          <a:bodyPr vert="horz" lIns="91440" tIns="45720" rIns="91440" bIns="45720" rtlCol="0" anchor="ctr"/>
+          <a:lstStyle/>
+          <a:p>
+            <a:endParaRPr lang="de-DE"/>
+          </a:p>
+        </p:txBody>
+      </p:sp>
+      <p:sp>
+        <p:nvSpPr>
+          <p:cNvPr id="5" name="Notizenplatzhalter 4"/>
+          <p:cNvSpPr>
+            <a:spLocks noGrp="1"/>
+          </p:cNvSpPr>
+          <p:nvPr>
+            <p:ph type="body" sz="quarter" idx="3"/>
+          </p:nvPr>
+        </p:nvSpPr>
+        <p:spPr>
+          <a:xfrm>
+            <a:off x="685800" y="4400550"/>
+            <a:ext cx="5486400" cy="3600450"/>
+          </a:xfrm>
+          <a:prstGeom prst="rect">
+            <a:avLst/>
+          </a:prstGeom>
+        </p:spPr>
+        <p:txBody>
+          <a:bodyPr vert="horz" lIns="91440" tIns="45720" rIns="91440" bIns="45720" rtlCol="0"/>
+          <a:lstStyle/>
+          <a:p>
+            <a:pPr lvl="0"/>
+            <a:r>
+              <a:rPr lang="de-DE" smtClean="0"/>
+              <a:t>Textmasterformat bearbeiten</a:t>
+            </a:r>
+          </a:p>
+          <a:p>
+            <a:pPr lvl="1"/>
+            <a:r>
+              <a:rPr lang="de-DE" smtClean="0"/>
+              <a:t>Zweite Ebene</a:t>
+            </a:r>
+          </a:p>
+          <a:p>
+            <a:pPr lvl="2"/>
+            <a:r>
+              <a:rPr lang="de-DE" smtClean="0"/>
+              <a:t>Dritte Ebene</a:t>
+            </a:r>
+          </a:p>
+          <a:p>
+            <a:pPr lvl="3"/>
+            <a:r>
+              <a:rPr lang="de-DE" smtClean="0"/>
+              <a:t>Vierte Ebene</a:t>
+            </a:r>
+          </a:p>
+          <a:p>
+            <a:pPr lvl="4"/>
+            <a:r>
+              <a:rPr lang="de-DE" smtClean="0"/>
+              <a:t>Fünfte Ebene</a:t>
+            </a:r>
+            <a:endParaRPr lang="de-DE"/>
+          </a:p>
+        </p:txBody>
+      </p:sp>
+      <p:sp>
+        <p:nvSpPr>
+          <p:cNvPr id="6" name="Fußzeilenplatzhalter 5"/>
+          <p:cNvSpPr>
+            <a:spLocks noGrp="1"/>
+          </p:cNvSpPr>
+          <p:nvPr>
+            <p:ph type="ftr" sz="quarter" idx="4"/>
+          </p:nvPr>
+        </p:nvSpPr>
+        <p:spPr>
+          <a:xfrm>
+            <a:off x="0" y="8685213"/>
+            <a:ext cx="2971800" cy="458787"/>
+          </a:xfrm>
+          <a:prstGeom prst="rect">
+            <a:avLst/>
+          </a:prstGeom>
+        </p:spPr>
+        <p:txBody>
+          <a:bodyPr vert="horz" lIns="91440" tIns="45720" rIns="91440" bIns="45720" rtlCol="0" anchor="b"/>
+          <a:lstStyle>
+            <a:lvl1pPr algn="l">
+              <a:defRPr sz="1200"/>
+            </a:lvl1pPr>
+          </a:lstStyle>
+          <a:p>
+            <a:endParaRPr lang="de-DE"/>
+          </a:p>
+        </p:txBody>
+      </p:sp>
+      <p:sp>
+        <p:nvSpPr>
+          <p:cNvPr id="7" name="Foliennummernplatzhalter 6"/>
+          <p:cNvSpPr>
+            <a:spLocks noGrp="1"/>
+          </p:cNvSpPr>
+          <p:nvPr>
+            <p:ph type="sldNum" sz="quarter" idx="5"/>
+          </p:nvPr>
+        </p:nvSpPr>
+        <p:spPr>
+          <a:xfrm>
+            <a:off x="3884613" y="8685213"/>
+            <a:ext cx="2971800" cy="458787"/>
+          </a:xfrm>
+          <a:prstGeom prst="rect">
+            <a:avLst/>
+          </a:prstGeom>
+        </p:spPr>
+        <p:txBody>
+          <a:bodyPr vert="horz" lIns="91440" tIns="45720" rIns="91440" bIns="45720" rtlCol="0" anchor="b"/>
+          <a:lstStyle>
+            <a:lvl1pPr algn="r">
+              <a:defRPr sz="1200"/>
+            </a:lvl1pPr>
+          </a:lstStyle>
+          <a:p>
+            <a:fld id="{EFE463A7-128E-4C2F-8D56-D1887786EAEB}" type="slidenum">
+              <a:rPr lang="de-DE" smtClean="0"/>
+              <a:t>‹Nr.›</a:t>
+            </a:fld>
+            <a:endParaRPr lang="de-DE"/>
+          </a:p>
+        </p:txBody>
+      </p:sp>
+    </p:spTree>
+    <p:extLst>
+      <p:ext uri="{BB962C8B-B14F-4D97-AF65-F5344CB8AC3E}">
+        <p14:creationId xmlns:p14="http://schemas.microsoft.com/office/powerpoint/2010/main" val="3410281063"/>
+      </p:ext>
+    </p:extLst>
+  </p:cSld>
+  <p:clrMap bg1="lt1" tx1="dk1" bg2="lt2" tx2="dk2" accent1="accent1" accent2="accent2" accent3="accent3" accent4="accent4" accent5="accent5" accent6="accent6" hlink="hlink" folHlink="folHlink"/>
+  <p:notesStyle>
+    <a:lvl1pPr marL="0" algn="l" defTabSz="914400" rtl="0" eaLnBrk="1" latinLnBrk="0" hangingPunct="1">
+      <a:defRPr sz="1200" kern="1200">
+        <a:solidFill>
+          <a:schemeClr val="tx1"/>
+        </a:solidFill>
+        <a:latin typeface="+mn-lt"/>
+        <a:ea typeface="+mn-ea"/>
+        <a:cs typeface="+mn-cs"/>
+      </a:defRPr>
+    </a:lvl1pPr>
+    <a:lvl2pPr marL="457200" algn="l" defTabSz="914400" rtl="0" eaLnBrk="1" latinLnBrk="0" hangingPunct="1">
+      <a:defRPr sz="1200" kern="1200">
+        <a:solidFill>
+          <a:schemeClr val="tx1"/>
+        </a:solidFill>
+        <a:latin typeface="+mn-lt"/>
+        <a:ea typeface="+mn-ea"/>
+        <a:cs typeface="+mn-cs"/>
+      </a:defRPr>
+    </a:lvl2pPr>
+    <a:lvl3pPr marL="914400" algn="l" defTabSz="914400" rtl="0" eaLnBrk="1" latinLnBrk="0" hangingPunct="1">
+      <a:defRPr sz="1200" kern="1200">
+        <a:solidFill>
+          <a:schemeClr val="tx1"/>
+        </a:solidFill>
+        <a:latin typeface="+mn-lt"/>
+        <a:ea typeface="+mn-ea"/>
+        <a:cs typeface="+mn-cs"/>
+      </a:defRPr>
+    </a:lvl3pPr>
+    <a:lvl4pPr marL="1371600" algn="l" defTabSz="914400" rtl="0" eaLnBrk="1" latinLnBrk="0" hangingPunct="1">
+      <a:defRPr sz="1200" kern="1200">
+        <a:solidFill>
+          <a:schemeClr val="tx1"/>
+        </a:solidFill>
+        <a:latin typeface="+mn-lt"/>
+        <a:ea typeface="+mn-ea"/>
+        <a:cs typeface="+mn-cs"/>
+      </a:defRPr>
+    </a:lvl4pPr>
+    <a:lvl5pPr marL="1828800" algn="l" defTabSz="914400" rtl="0" eaLnBrk="1" latinLnBrk="0" hangingPunct="1">
+      <a:defRPr sz="1200" kern="1200">
+        <a:solidFill>
+          <a:schemeClr val="tx1"/>
+        </a:solidFill>
+        <a:latin typeface="+mn-lt"/>
+        <a:ea typeface="+mn-ea"/>
+        <a:cs typeface="+mn-cs"/>
+      </a:defRPr>
+    </a:lvl5pPr>
+    <a:lvl6pPr marL="2286000" algn="l" defTabSz="914400" rtl="0" eaLnBrk="1" latinLnBrk="0" hangingPunct="1">
+      <a:defRPr sz="1200" kern="1200">
+        <a:solidFill>
+          <a:schemeClr val="tx1"/>
+        </a:solidFill>
+        <a:latin typeface="+mn-lt"/>
+        <a:ea typeface="+mn-ea"/>
+        <a:cs typeface="+mn-cs"/>
+      </a:defRPr>
+    </a:lvl6pPr>
+    <a:lvl7pPr marL="2743200" algn="l" defTabSz="914400" rtl="0" eaLnBrk="1" latinLnBrk="0" hangingPunct="1">
+      <a:defRPr sz="1200" kern="1200">
+        <a:solidFill>
+          <a:schemeClr val="tx1"/>
+        </a:solidFill>
+        <a:latin typeface="+mn-lt"/>
+        <a:ea typeface="+mn-ea"/>
+        <a:cs typeface="+mn-cs"/>
+      </a:defRPr>
+    </a:lvl7pPr>
+    <a:lvl8pPr marL="3200400" algn="l" defTabSz="914400" rtl="0" eaLnBrk="1" latinLnBrk="0" hangingPunct="1">
+      <a:defRPr sz="1200" kern="1200">
+        <a:solidFill>
+          <a:schemeClr val="tx1"/>
+        </a:solidFill>
+        <a:latin typeface="+mn-lt"/>
+        <a:ea typeface="+mn-ea"/>
+        <a:cs typeface="+mn-cs"/>
+      </a:defRPr>
+    </a:lvl8pPr>
+    <a:lvl9pPr marL="3657600" algn="l" defTabSz="914400" rtl="0" eaLnBrk="1" latinLnBrk="0" hangingPunct="1">
+      <a:defRPr sz="1200" kern="1200">
+        <a:solidFill>
+          <a:schemeClr val="tx1"/>
+        </a:solidFill>
+        <a:latin typeface="+mn-lt"/>
+        <a:ea typeface="+mn-ea"/>
+        <a:cs typeface="+mn-cs"/>
+      </a:defRPr>
+    </a:lvl9pPr>
+  </p:notesStyle>
+</p:notesMaster>
+</file>
+
+<file path=ppt/notesSlides/notesSlide1.xml><?xml version="1.0" encoding="utf-8"?>
+<p:notes xmlns:a="http://schemas.openxmlformats.org/drawingml/2006/main" xmlns:r="http://schemas.openxmlformats.org/officeDocument/2006/relationships" xmlns:p="http://schemas.openxmlformats.org/presentationml/2006/main">
+  <p:cSld>
+    <p:spTree>
+      <p:nvGrpSpPr>
+        <p:cNvPr id="1" name=""/>
+        <p:cNvGrpSpPr/>
+        <p:nvPr/>
+      </p:nvGrpSpPr>
+      <p:grpSpPr>
+        <a:xfrm>
+          <a:off x="0" y="0"/>
+          <a:ext cx="0" cy="0"/>
+          <a:chOff x="0" y="0"/>
+          <a:chExt cx="0" cy="0"/>
+        </a:xfrm>
+      </p:grpSpPr>
+      <p:sp>
+        <p:nvSpPr>
+          <p:cNvPr id="2" name="Folienbildplatzhalter 1"/>
+          <p:cNvSpPr>
+            <a:spLocks noGrp="1" noRot="1" noChangeAspect="1"/>
+          </p:cNvSpPr>
+          <p:nvPr>
+            <p:ph type="sldImg"/>
+          </p:nvPr>
+        </p:nvSpPr>
+        <p:spPr/>
+      </p:sp>
+      <p:sp>
+        <p:nvSpPr>
+          <p:cNvPr id="3" name="Notizenplatzhalter 2"/>
+          <p:cNvSpPr>
+            <a:spLocks noGrp="1"/>
+          </p:cNvSpPr>
+          <p:nvPr>
+            <p:ph type="body" idx="1"/>
+          </p:nvPr>
+        </p:nvSpPr>
+        <p:spPr/>
+        <p:txBody>
+          <a:bodyPr/>
+          <a:lstStyle/>
+          <a:p>
+            <a:endParaRPr lang="de-DE" dirty="0"/>
+          </a:p>
+        </p:txBody>
+      </p:sp>
+      <p:sp>
+        <p:nvSpPr>
+          <p:cNvPr id="4" name="Foliennummernplatzhalter 3"/>
+          <p:cNvSpPr>
+            <a:spLocks noGrp="1"/>
+          </p:cNvSpPr>
+          <p:nvPr>
+            <p:ph type="sldNum" sz="quarter" idx="10"/>
+          </p:nvPr>
+        </p:nvSpPr>
+        <p:spPr/>
+        <p:txBody>
+          <a:bodyPr/>
+          <a:lstStyle/>
+          <a:p>
+            <a:fld id="{EFE463A7-128E-4C2F-8D56-D1887786EAEB}" type="slidenum">
+              <a:rPr lang="de-DE" smtClean="0"/>
+              <a:t>3</a:t>
+            </a:fld>
+            <a:endParaRPr lang="de-DE"/>
+          </a:p>
+        </p:txBody>
+      </p:sp>
+    </p:spTree>
+    <p:extLst>
+      <p:ext uri="{BB962C8B-B14F-4D97-AF65-F5344CB8AC3E}">
+        <p14:creationId xmlns:p14="http://schemas.microsoft.com/office/powerpoint/2010/main" val="273782014"/>
+      </p:ext>
+    </p:extLst>
+  </p:cSld>
+  <p:clrMapOvr>
+    <a:masterClrMapping/>
+  </p:clrMapOvr>
+</p:notes>
 </file>
 
 <file path=ppt/slideLayouts/slideLayout1.xml><?xml version="1.0" encoding="utf-8"?>
@@ -250,7 +695,7 @@
           <a:p>
             <a:fld id="{3BC68926-E156-4298-9181-A9EE24F972DE}" type="datetimeFigureOut">
               <a:rPr lang="de-DE" smtClean="0"/>
-              <a:t>12.07.2018</a:t>
+              <a:t>22.07.2018</a:t>
             </a:fld>
             <a:endParaRPr lang="de-DE"/>
           </a:p>
@@ -420,7 +865,7 @@
           <a:p>
             <a:fld id="{3BC68926-E156-4298-9181-A9EE24F972DE}" type="datetimeFigureOut">
               <a:rPr lang="de-DE" smtClean="0"/>
-              <a:t>12.07.2018</a:t>
+              <a:t>22.07.2018</a:t>
             </a:fld>
             <a:endParaRPr lang="de-DE"/>
           </a:p>
@@ -600,7 +1045,7 @@
           <a:p>
             <a:fld id="{3BC68926-E156-4298-9181-A9EE24F972DE}" type="datetimeFigureOut">
               <a:rPr lang="de-DE" smtClean="0"/>
-              <a:t>12.07.2018</a:t>
+              <a:t>22.07.2018</a:t>
             </a:fld>
             <a:endParaRPr lang="de-DE"/>
           </a:p>
@@ -770,7 +1215,7 @@
           <a:p>
             <a:fld id="{3BC68926-E156-4298-9181-A9EE24F972DE}" type="datetimeFigureOut">
               <a:rPr lang="de-DE" smtClean="0"/>
-              <a:t>12.07.2018</a:t>
+              <a:t>22.07.2018</a:t>
             </a:fld>
             <a:endParaRPr lang="de-DE"/>
           </a:p>
@@ -1016,7 +1461,7 @@
           <a:p>
             <a:fld id="{3BC68926-E156-4298-9181-A9EE24F972DE}" type="datetimeFigureOut">
               <a:rPr lang="de-DE" smtClean="0"/>
-              <a:t>12.07.2018</a:t>
+              <a:t>22.07.2018</a:t>
             </a:fld>
             <a:endParaRPr lang="de-DE"/>
           </a:p>
@@ -1248,7 +1693,7 @@
           <a:p>
             <a:fld id="{3BC68926-E156-4298-9181-A9EE24F972DE}" type="datetimeFigureOut">
               <a:rPr lang="de-DE" smtClean="0"/>
-              <a:t>12.07.2018</a:t>
+              <a:t>22.07.2018</a:t>
             </a:fld>
             <a:endParaRPr lang="de-DE"/>
           </a:p>
@@ -1615,7 +2060,7 @@
           <a:p>
             <a:fld id="{3BC68926-E156-4298-9181-A9EE24F972DE}" type="datetimeFigureOut">
               <a:rPr lang="de-DE" smtClean="0"/>
-              <a:t>12.07.2018</a:t>
+              <a:t>22.07.2018</a:t>
             </a:fld>
             <a:endParaRPr lang="de-DE"/>
           </a:p>
@@ -1733,7 +2178,7 @@
           <a:p>
             <a:fld id="{3BC68926-E156-4298-9181-A9EE24F972DE}" type="datetimeFigureOut">
               <a:rPr lang="de-DE" smtClean="0"/>
-              <a:t>12.07.2018</a:t>
+              <a:t>22.07.2018</a:t>
             </a:fld>
             <a:endParaRPr lang="de-DE"/>
           </a:p>
@@ -1828,7 +2273,7 @@
           <a:p>
             <a:fld id="{3BC68926-E156-4298-9181-A9EE24F972DE}" type="datetimeFigureOut">
               <a:rPr lang="de-DE" smtClean="0"/>
-              <a:t>12.07.2018</a:t>
+              <a:t>22.07.2018</a:t>
             </a:fld>
             <a:endParaRPr lang="de-DE"/>
           </a:p>
@@ -2105,7 +2550,7 @@
           <a:p>
             <a:fld id="{3BC68926-E156-4298-9181-A9EE24F972DE}" type="datetimeFigureOut">
               <a:rPr lang="de-DE" smtClean="0"/>
-              <a:t>12.07.2018</a:t>
+              <a:t>22.07.2018</a:t>
             </a:fld>
             <a:endParaRPr lang="de-DE"/>
           </a:p>
@@ -2358,7 +2803,7 @@
           <a:p>
             <a:fld id="{3BC68926-E156-4298-9181-A9EE24F972DE}" type="datetimeFigureOut">
               <a:rPr lang="de-DE" smtClean="0"/>
-              <a:t>12.07.2018</a:t>
+              <a:t>22.07.2018</a:t>
             </a:fld>
             <a:endParaRPr lang="de-DE"/>
           </a:p>
@@ -2571,7 +3016,7 @@
           <a:p>
             <a:fld id="{3BC68926-E156-4298-9181-A9EE24F972DE}" type="datetimeFigureOut">
               <a:rPr lang="de-DE" smtClean="0"/>
-              <a:t>12.07.2018</a:t>
+              <a:t>22.07.2018</a:t>
             </a:fld>
             <a:endParaRPr lang="de-DE"/>
           </a:p>
@@ -3054,7 +3499,7 @@
                   <a:schemeClr val="bg1"/>
                 </a:solidFill>
               </a:rPr>
-              <a:t>Vorbereitungen</a:t>
+              <a:t>1: Vorbereitungen</a:t>
             </a:r>
             <a:endParaRPr lang="de-DE" dirty="0">
               <a:solidFill>
@@ -3126,7 +3571,7 @@
                   <a:schemeClr val="bg1"/>
                 </a:solidFill>
               </a:rPr>
-              <a:t>Installation prüfen</a:t>
+              <a:t>Media Account lokal starten</a:t>
             </a:r>
             <a:endParaRPr lang="de-DE" dirty="0">
               <a:solidFill>
@@ -3148,8 +3593,8 @@
         </p:nvSpPr>
         <p:spPr>
           <a:xfrm>
-            <a:off x="838200" y="1825624"/>
-            <a:ext cx="10515600" cy="4653329"/>
+            <a:off x="838200" y="1532964"/>
+            <a:ext cx="10515600" cy="5325035"/>
           </a:xfrm>
         </p:spPr>
         <p:txBody>
@@ -3158,9 +3603,32 @@
           </a:bodyPr>
           <a:lstStyle/>
           <a:p>
-            <a:pPr marL="0" indent="0">
-              <a:buNone/>
-            </a:pPr>
+            <a:r>
+              <a:rPr lang="de-DE" dirty="0" smtClean="0">
+                <a:solidFill>
+                  <a:schemeClr val="bg1"/>
+                </a:solidFill>
+              </a:rPr>
+              <a:t>VS2017: Projekt ‚Backend‘ mit ‚IIS Express (</a:t>
+            </a:r>
+            <a:r>
+              <a:rPr lang="de-DE" dirty="0" err="1" smtClean="0">
+                <a:solidFill>
+                  <a:schemeClr val="bg1"/>
+                </a:solidFill>
+              </a:rPr>
+              <a:t>prod</a:t>
+            </a:r>
+            <a:r>
+              <a:rPr lang="de-DE" dirty="0" smtClean="0">
+                <a:solidFill>
+                  <a:schemeClr val="bg1"/>
+                </a:solidFill>
+              </a:rPr>
+              <a:t>)‘ starten</a:t>
+            </a:r>
+          </a:p>
+          <a:p>
             <a:endParaRPr lang="de-DE" dirty="0" smtClean="0">
               <a:solidFill>
                 <a:schemeClr val="bg1"/>
@@ -3168,6 +3636,244 @@
             </a:endParaRPr>
           </a:p>
           <a:p>
+            <a:r>
+              <a:rPr lang="de-DE" dirty="0" smtClean="0">
+                <a:solidFill>
+                  <a:schemeClr val="bg1"/>
+                </a:solidFill>
+              </a:rPr>
+              <a:t>VS Code</a:t>
+            </a:r>
+            <a:r>
+              <a:rPr lang="de-DE" dirty="0" smtClean="0">
+                <a:solidFill>
+                  <a:schemeClr val="bg1"/>
+                </a:solidFill>
+              </a:rPr>
+              <a:t>:</a:t>
+            </a:r>
+          </a:p>
+          <a:p>
+            <a:pPr lvl="1"/>
+            <a:r>
+              <a:rPr lang="de-DE" dirty="0" smtClean="0">
+                <a:solidFill>
+                  <a:schemeClr val="bg1"/>
+                </a:solidFill>
+              </a:rPr>
+              <a:t>Ordner ‚\ma2017\Source\UI‘ öffnen</a:t>
+            </a:r>
+          </a:p>
+          <a:p>
+            <a:pPr lvl="1"/>
+            <a:r>
+              <a:rPr lang="de-DE" dirty="0" smtClean="0">
+                <a:solidFill>
+                  <a:schemeClr val="bg1"/>
+                </a:solidFill>
+              </a:rPr>
+              <a:t>Terminal öffnen	(STRG + Ö)</a:t>
+            </a:r>
+          </a:p>
+          <a:p>
+            <a:pPr lvl="1"/>
+            <a:r>
+              <a:rPr lang="de-DE" dirty="0" smtClean="0">
+                <a:solidFill>
+                  <a:schemeClr val="bg1"/>
+                </a:solidFill>
+              </a:rPr>
+              <a:t>&gt; </a:t>
+            </a:r>
+            <a:r>
+              <a:rPr lang="de-DE" dirty="0" err="1" smtClean="0">
+                <a:solidFill>
+                  <a:schemeClr val="bg1"/>
+                </a:solidFill>
+              </a:rPr>
+              <a:t>npm</a:t>
+            </a:r>
+            <a:r>
+              <a:rPr lang="de-DE" dirty="0" smtClean="0">
+                <a:solidFill>
+                  <a:schemeClr val="bg1"/>
+                </a:solidFill>
+              </a:rPr>
+              <a:t> </a:t>
+            </a:r>
+            <a:r>
+              <a:rPr lang="de-DE" dirty="0" err="1" smtClean="0">
+                <a:solidFill>
+                  <a:schemeClr val="bg1"/>
+                </a:solidFill>
+              </a:rPr>
+              <a:t>install</a:t>
+            </a:r>
+            <a:r>
+              <a:rPr lang="de-DE" dirty="0" smtClean="0">
+                <a:solidFill>
+                  <a:schemeClr val="bg1"/>
+                </a:solidFill>
+              </a:rPr>
+              <a:t> 	(installiert verwendete </a:t>
+            </a:r>
+            <a:r>
+              <a:rPr lang="de-DE" dirty="0" err="1" smtClean="0">
+                <a:solidFill>
+                  <a:schemeClr val="bg1"/>
+                </a:solidFill>
+              </a:rPr>
+              <a:t>Pakages</a:t>
+            </a:r>
+            <a:r>
+              <a:rPr lang="de-DE" dirty="0" smtClean="0">
+                <a:solidFill>
+                  <a:schemeClr val="bg1"/>
+                </a:solidFill>
+              </a:rPr>
+              <a:t>)</a:t>
+            </a:r>
+          </a:p>
+          <a:p>
+            <a:pPr lvl="1"/>
+            <a:r>
+              <a:rPr lang="de-DE" dirty="0" smtClean="0">
+                <a:solidFill>
+                  <a:schemeClr val="bg1"/>
+                </a:solidFill>
+              </a:rPr>
+              <a:t>&gt; </a:t>
+            </a:r>
+            <a:r>
+              <a:rPr lang="de-DE" dirty="0" err="1" smtClean="0">
+                <a:solidFill>
+                  <a:schemeClr val="bg1"/>
+                </a:solidFill>
+              </a:rPr>
+              <a:t>npm</a:t>
+            </a:r>
+            <a:r>
+              <a:rPr lang="de-DE" dirty="0" smtClean="0">
+                <a:solidFill>
+                  <a:schemeClr val="bg1"/>
+                </a:solidFill>
+              </a:rPr>
+              <a:t> </a:t>
+            </a:r>
+            <a:r>
+              <a:rPr lang="de-DE" dirty="0" err="1" smtClean="0">
+                <a:solidFill>
+                  <a:schemeClr val="bg1"/>
+                </a:solidFill>
+              </a:rPr>
+              <a:t>run</a:t>
+            </a:r>
+            <a:r>
+              <a:rPr lang="de-DE" dirty="0" smtClean="0">
+                <a:solidFill>
+                  <a:schemeClr val="bg1"/>
+                </a:solidFill>
+              </a:rPr>
+              <a:t> </a:t>
+            </a:r>
+            <a:r>
+              <a:rPr lang="de-DE" dirty="0" err="1" smtClean="0">
+                <a:solidFill>
+                  <a:schemeClr val="bg1"/>
+                </a:solidFill>
+              </a:rPr>
+              <a:t>build</a:t>
+            </a:r>
+            <a:r>
+              <a:rPr lang="de-DE" dirty="0" smtClean="0">
+                <a:solidFill>
+                  <a:schemeClr val="bg1"/>
+                </a:solidFill>
+              </a:rPr>
+              <a:t>	(baut das Projekt)</a:t>
+            </a:r>
+          </a:p>
+          <a:p>
+            <a:pPr lvl="1"/>
+            <a:r>
+              <a:rPr lang="de-DE" dirty="0" smtClean="0">
+                <a:solidFill>
+                  <a:schemeClr val="bg1"/>
+                </a:solidFill>
+              </a:rPr>
+              <a:t>&gt; </a:t>
+            </a:r>
+            <a:r>
+              <a:rPr lang="de-DE" dirty="0" err="1" smtClean="0">
+                <a:solidFill>
+                  <a:schemeClr val="bg1"/>
+                </a:solidFill>
+              </a:rPr>
+              <a:t>npm</a:t>
+            </a:r>
+            <a:r>
+              <a:rPr lang="de-DE" dirty="0" smtClean="0">
+                <a:solidFill>
+                  <a:schemeClr val="bg1"/>
+                </a:solidFill>
+              </a:rPr>
+              <a:t> </a:t>
+            </a:r>
+            <a:r>
+              <a:rPr lang="de-DE" dirty="0" err="1" smtClean="0">
+                <a:solidFill>
+                  <a:schemeClr val="bg1"/>
+                </a:solidFill>
+              </a:rPr>
+              <a:t>start</a:t>
+            </a:r>
+            <a:r>
+              <a:rPr lang="de-DE" dirty="0" smtClean="0">
+                <a:solidFill>
+                  <a:schemeClr val="bg1"/>
+                </a:solidFill>
+              </a:rPr>
+              <a:t>	(startet die </a:t>
+            </a:r>
+            <a:r>
+              <a:rPr lang="de-DE" dirty="0" err="1" smtClean="0">
+                <a:solidFill>
+                  <a:schemeClr val="bg1"/>
+                </a:solidFill>
+              </a:rPr>
+              <a:t>Ui</a:t>
+            </a:r>
+            <a:r>
+              <a:rPr lang="de-DE" dirty="0" smtClean="0">
+                <a:solidFill>
+                  <a:schemeClr val="bg1"/>
+                </a:solidFill>
+              </a:rPr>
+              <a:t> auf</a:t>
+            </a:r>
+            <a:r>
+              <a:rPr lang="de-DE" dirty="0" smtClean="0">
+                <a:solidFill>
+                  <a:schemeClr val="bg1"/>
+                </a:solidFill>
+              </a:rPr>
+              <a:t> </a:t>
+            </a:r>
+            <a:r>
+              <a:rPr lang="de-DE" dirty="0">
+                <a:solidFill>
+                  <a:schemeClr val="bg1"/>
+                </a:solidFill>
+              </a:rPr>
+              <a:t>http://localhost:3000/)</a:t>
+            </a:r>
+            <a:endParaRPr lang="de-DE" dirty="0" smtClean="0">
+              <a:solidFill>
+                <a:schemeClr val="bg1"/>
+              </a:solidFill>
+            </a:endParaRPr>
+          </a:p>
+          <a:p>
             <a:endParaRPr lang="de-DE" dirty="0">
               <a:solidFill>
                 <a:schemeClr val="bg1"/>
@@ -3201,104 +3907,12 @@
                 <a:schemeClr val="bg1"/>
               </a:solidFill>
             </a:endParaRPr>
-          </a:p>
-          <a:p>
-            <a:r>
-              <a:rPr lang="de-DE" dirty="0" smtClean="0">
-                <a:solidFill>
-                  <a:schemeClr val="bg1"/>
-                </a:solidFill>
-              </a:rPr>
-              <a:t>&gt; </a:t>
-            </a:r>
-            <a:r>
-              <a:rPr lang="de-DE" dirty="0" err="1" smtClean="0">
-                <a:solidFill>
-                  <a:schemeClr val="bg1"/>
-                </a:solidFill>
-              </a:rPr>
-              <a:t>java</a:t>
-            </a:r>
-            <a:r>
-              <a:rPr lang="de-DE" dirty="0" smtClean="0">
-                <a:solidFill>
-                  <a:schemeClr val="bg1"/>
-                </a:solidFill>
-              </a:rPr>
-              <a:t> –</a:t>
-            </a:r>
-            <a:r>
-              <a:rPr lang="de-DE" dirty="0" err="1" smtClean="0">
-                <a:solidFill>
-                  <a:schemeClr val="bg1"/>
-                </a:solidFill>
-              </a:rPr>
-              <a:t>version</a:t>
-            </a:r>
-            <a:r>
-              <a:rPr lang="de-DE" dirty="0">
-                <a:solidFill>
-                  <a:schemeClr val="bg1"/>
-                </a:solidFill>
-              </a:rPr>
-              <a:t> </a:t>
-            </a:r>
-            <a:r>
-              <a:rPr lang="de-DE" dirty="0" smtClean="0">
-                <a:solidFill>
-                  <a:schemeClr val="bg1"/>
-                </a:solidFill>
-              </a:rPr>
-              <a:t>-&gt; </a:t>
-            </a:r>
-            <a:r>
-              <a:rPr lang="de-DE" dirty="0" err="1" smtClean="0">
-                <a:solidFill>
-                  <a:schemeClr val="bg1"/>
-                </a:solidFill>
-              </a:rPr>
-              <a:t>java</a:t>
-            </a:r>
-            <a:r>
-              <a:rPr lang="de-DE" dirty="0" smtClean="0">
-                <a:solidFill>
-                  <a:schemeClr val="bg1"/>
-                </a:solidFill>
-              </a:rPr>
-              <a:t> </a:t>
-            </a:r>
-            <a:r>
-              <a:rPr lang="de-DE" dirty="0" err="1" smtClean="0">
-                <a:solidFill>
-                  <a:schemeClr val="bg1"/>
-                </a:solidFill>
-              </a:rPr>
-              <a:t>version</a:t>
-            </a:r>
-            <a:r>
-              <a:rPr lang="de-DE" dirty="0" smtClean="0">
-                <a:solidFill>
-                  <a:schemeClr val="bg1"/>
-                </a:solidFill>
-              </a:rPr>
-              <a:t> "10.0.1" 2018-04-17</a:t>
-            </a:r>
-          </a:p>
-          <a:p>
-            <a:r>
-              <a:rPr lang="de-DE" dirty="0" smtClean="0">
-                <a:solidFill>
-                  <a:schemeClr val="bg1"/>
-                </a:solidFill>
-              </a:rPr>
-              <a:t>&gt; echo %JAVA_HOME -&gt; C:\Program Files\Java\jdk-10.0.1</a:t>
-            </a:r>
           </a:p>
         </p:txBody>
       </p:sp>
       <p:pic>
         <p:nvPicPr>
-          <p:cNvPr id="6" name="Grafik 5"/>
+          <p:cNvPr id="4" name="Grafik 3"/>
           <p:cNvPicPr>
             <a:picLocks noChangeAspect="1"/>
           </p:cNvPicPr>
@@ -3318,8 +3932,38 @@
         </p:blipFill>
         <p:spPr>
           <a:xfrm>
-            <a:off x="2004441" y="1825624"/>
-            <a:ext cx="8183117" cy="2753109"/>
+            <a:off x="838200" y="2032843"/>
+            <a:ext cx="5334744" cy="314369"/>
+          </a:xfrm>
+          <a:prstGeom prst="rect">
+            <a:avLst/>
+          </a:prstGeom>
+        </p:spPr>
+      </p:pic>
+      <p:pic>
+        <p:nvPicPr>
+          <p:cNvPr id="7" name="Grafik 6"/>
+          <p:cNvPicPr>
+            <a:picLocks noChangeAspect="1"/>
+          </p:cNvPicPr>
+          <p:nvPr/>
+        </p:nvPicPr>
+        <p:blipFill>
+          <a:blip r:embed="rId3">
+            <a:extLst>
+              <a:ext uri="{28A0092B-C50C-407E-A947-70E740481C1C}">
+                <a14:useLocalDpi xmlns:a14="http://schemas.microsoft.com/office/drawing/2010/main" val="0"/>
+              </a:ext>
+            </a:extLst>
+          </a:blip>
+          <a:stretch>
+            <a:fillRect/>
+          </a:stretch>
+        </p:blipFill>
+        <p:spPr>
+          <a:xfrm>
+            <a:off x="838200" y="5052378"/>
+            <a:ext cx="10058400" cy="1577371"/>
           </a:xfrm>
           <a:prstGeom prst="rect">
             <a:avLst/>
@@ -3329,7 +3973,7 @@
     </p:spTree>
     <p:extLst>
       <p:ext uri="{BB962C8B-B14F-4D97-AF65-F5344CB8AC3E}">
-        <p14:creationId xmlns:p14="http://schemas.microsoft.com/office/powerpoint/2010/main" val="1642100510"/>
+        <p14:creationId xmlns:p14="http://schemas.microsoft.com/office/powerpoint/2010/main" val="1633532023"/>
       </p:ext>
     </p:extLst>
   </p:cSld>
@@ -3390,36 +4034,12 @@
           <a:lstStyle/>
           <a:p>
             <a:r>
-              <a:rPr lang="de-DE" dirty="0" err="1" smtClean="0">
-                <a:solidFill>
-                  <a:schemeClr val="bg1"/>
-                </a:solidFill>
-              </a:rPr>
-              <a:t>Elastic</a:t>
-            </a:r>
-            <a:r>
-              <a:rPr lang="de-DE" dirty="0" smtClean="0">
-                <a:solidFill>
-                  <a:schemeClr val="bg1"/>
-                </a:solidFill>
-              </a:rPr>
-              <a:t> Search &amp; </a:t>
-            </a:r>
-            <a:r>
-              <a:rPr lang="de-DE" dirty="0" err="1" smtClean="0">
-                <a:solidFill>
-                  <a:schemeClr val="bg1"/>
-                </a:solidFill>
-              </a:rPr>
-              <a:t>Kibana</a:t>
-            </a:r>
-            <a:r>
-              <a:rPr lang="de-DE" dirty="0" smtClean="0">
-                <a:solidFill>
-                  <a:schemeClr val="bg1"/>
-                </a:solidFill>
-              </a:rPr>
-              <a:t> (optional)</a:t>
+              <a:rPr lang="de-DE" dirty="0" smtClean="0">
+                <a:solidFill>
+                  <a:schemeClr val="bg1"/>
+                </a:solidFill>
+              </a:rPr>
+              <a:t>Persönliches Azure Portal (optional)</a:t>
             </a:r>
             <a:endParaRPr lang="de-DE" dirty="0">
               <a:solidFill>
@@ -3442,12 +4062,12 @@
         <p:spPr>
           <a:xfrm>
             <a:off x="838200" y="1825624"/>
-            <a:ext cx="10515600" cy="5032376"/>
+            <a:ext cx="10515600" cy="4653329"/>
           </a:xfrm>
         </p:spPr>
         <p:txBody>
           <a:bodyPr>
-            <a:normAutofit fontScale="92500" lnSpcReduction="10000"/>
+            <a:normAutofit/>
           </a:bodyPr>
           <a:lstStyle/>
           <a:p>
@@ -3503,47 +4123,37 @@
             </a:endParaRPr>
           </a:p>
           <a:p>
+            <a:r>
+              <a:rPr lang="de-DE" dirty="0" smtClean="0">
+                <a:solidFill>
+                  <a:schemeClr val="bg1"/>
+                </a:solidFill>
+              </a:rPr>
+              <a:t>Kostenlos und 170€ Startguthaben im ersten Monat</a:t>
+            </a:r>
+          </a:p>
+          <a:p>
+            <a:r>
+              <a:rPr lang="de-DE" dirty="0" smtClean="0">
+                <a:solidFill>
+                  <a:schemeClr val="bg1"/>
+                </a:solidFill>
+              </a:rPr>
+              <a:t>Microsoft Account und Kreditkarte erforderlich</a:t>
+            </a:r>
+          </a:p>
+          <a:p>
             <a:endParaRPr lang="de-DE" dirty="0" smtClean="0">
               <a:solidFill>
                 <a:schemeClr val="bg1"/>
               </a:solidFill>
             </a:endParaRPr>
-          </a:p>
-          <a:p>
-            <a:r>
-              <a:rPr lang="de-DE" sz="3000" dirty="0" smtClean="0">
-                <a:solidFill>
-                  <a:schemeClr val="bg1"/>
-                </a:solidFill>
-              </a:rPr>
-              <a:t>https://www.elastic.co/start</a:t>
-            </a:r>
-          </a:p>
-          <a:p>
-            <a:r>
-              <a:rPr lang="de-DE" sz="3000" dirty="0" smtClean="0">
-                <a:solidFill>
-                  <a:schemeClr val="bg1"/>
-                </a:solidFill>
-              </a:rPr>
-              <a:t>&gt; bin\elasticsearch.bat</a:t>
-            </a:r>
-          </a:p>
-          <a:p>
-            <a:r>
-              <a:rPr lang="de-DE" sz="3000" dirty="0" smtClean="0">
-                <a:solidFill>
-                  <a:schemeClr val="bg1"/>
-                </a:solidFill>
-              </a:rPr>
-              <a:t>http://localhost:9200/</a:t>
-            </a:r>
           </a:p>
         </p:txBody>
       </p:sp>
       <p:pic>
         <p:nvPicPr>
-          <p:cNvPr id="5" name="Grafik 4"/>
+          <p:cNvPr id="4" name="Grafik 3"/>
           <p:cNvPicPr>
             <a:picLocks noChangeAspect="1"/>
           </p:cNvPicPr>
@@ -3564,7 +4174,7 @@
         <p:spPr>
           <a:xfrm>
             <a:off x="1066800" y="1825624"/>
-            <a:ext cx="10058400" cy="3107698"/>
+            <a:ext cx="10058400" cy="2989772"/>
           </a:xfrm>
           <a:prstGeom prst="rect">
             <a:avLst/>
@@ -3574,7 +4184,7 @@
     </p:spTree>
     <p:extLst>
       <p:ext uri="{BB962C8B-B14F-4D97-AF65-F5344CB8AC3E}">
-        <p14:creationId xmlns:p14="http://schemas.microsoft.com/office/powerpoint/2010/main" val="1689494907"/>
+        <p14:creationId xmlns:p14="http://schemas.microsoft.com/office/powerpoint/2010/main" val="3202439275"/>
       </p:ext>
     </p:extLst>
   </p:cSld>
@@ -3635,12 +4245,12 @@
           <a:lstStyle/>
           <a:p>
             <a:r>
-              <a:rPr lang="de-DE" smtClean="0">
-                <a:solidFill>
-                  <a:schemeClr val="bg1"/>
-                </a:solidFill>
-              </a:rPr>
-              <a:t>Demo 1: Azure</a:t>
+              <a:rPr lang="de-DE" dirty="0" smtClean="0">
+                <a:solidFill>
+                  <a:schemeClr val="bg1"/>
+                </a:solidFill>
+              </a:rPr>
+              <a:t>Azure Storage Account</a:t>
             </a:r>
             <a:endParaRPr lang="de-DE" dirty="0">
               <a:solidFill>
@@ -3663,7 +4273,7 @@
         <p:spPr>
           <a:xfrm>
             <a:off x="838200" y="1825624"/>
-            <a:ext cx="10515600" cy="4653329"/>
+            <a:ext cx="10515600" cy="5032376"/>
           </a:xfrm>
         </p:spPr>
         <p:txBody>
@@ -3675,66 +4285,104 @@
             <a:pPr marL="0" indent="0">
               <a:buNone/>
             </a:pPr>
-            <a:endParaRPr lang="de-DE" smtClean="0">
-              <a:solidFill>
-                <a:schemeClr val="bg1"/>
-              </a:solidFill>
-            </a:endParaRPr>
-          </a:p>
-          <a:p>
-            <a:endParaRPr lang="de-DE" smtClean="0">
-              <a:solidFill>
-                <a:schemeClr val="bg1"/>
-              </a:solidFill>
-            </a:endParaRPr>
-          </a:p>
-          <a:p>
-            <a:endParaRPr lang="de-DE" smtClean="0">
-              <a:solidFill>
-                <a:schemeClr val="bg1"/>
-              </a:solidFill>
-            </a:endParaRPr>
-          </a:p>
-          <a:p>
-            <a:endParaRPr lang="de-DE" smtClean="0">
-              <a:solidFill>
-                <a:schemeClr val="bg1"/>
-              </a:solidFill>
-            </a:endParaRPr>
-          </a:p>
-          <a:p>
-            <a:endParaRPr lang="de-DE" smtClean="0">
-              <a:solidFill>
-                <a:schemeClr val="bg1"/>
-              </a:solidFill>
-            </a:endParaRPr>
-          </a:p>
-          <a:p>
-            <a:endParaRPr lang="de-DE" smtClean="0">
-              <a:solidFill>
-                <a:schemeClr val="bg1"/>
-              </a:solidFill>
-            </a:endParaRPr>
-          </a:p>
-          <a:p>
-            <a:r>
-              <a:rPr lang="de-DE" smtClean="0">
-                <a:solidFill>
-                  <a:schemeClr val="bg1"/>
-                </a:solidFill>
-              </a:rPr>
-              <a:t>.</a:t>
-            </a:r>
-          </a:p>
-          <a:p>
             <a:endParaRPr lang="de-DE" dirty="0" smtClean="0">
               <a:solidFill>
                 <a:schemeClr val="bg1"/>
               </a:solidFill>
             </a:endParaRPr>
           </a:p>
-        </p:txBody>
-      </p:sp>
+          <a:p>
+            <a:endParaRPr lang="de-DE" dirty="0">
+              <a:solidFill>
+                <a:schemeClr val="bg1"/>
+              </a:solidFill>
+            </a:endParaRPr>
+          </a:p>
+          <a:p>
+            <a:pPr marL="0" indent="0">
+              <a:buNone/>
+            </a:pPr>
+            <a:endParaRPr lang="de-DE" dirty="0" smtClean="0">
+              <a:solidFill>
+                <a:schemeClr val="bg1"/>
+              </a:solidFill>
+            </a:endParaRPr>
+          </a:p>
+          <a:p>
+            <a:endParaRPr lang="de-DE" dirty="0" smtClean="0">
+              <a:solidFill>
+                <a:schemeClr val="bg1"/>
+              </a:solidFill>
+            </a:endParaRPr>
+          </a:p>
+          <a:p>
+            <a:endParaRPr lang="de-DE" dirty="0" smtClean="0">
+              <a:solidFill>
+                <a:schemeClr val="bg1"/>
+              </a:solidFill>
+            </a:endParaRPr>
+          </a:p>
+          <a:p>
+            <a:endParaRPr lang="de-DE" dirty="0" smtClean="0">
+              <a:solidFill>
+                <a:schemeClr val="bg1"/>
+              </a:solidFill>
+            </a:endParaRPr>
+          </a:p>
+          <a:p>
+            <a:endParaRPr lang="de-DE" dirty="0" smtClean="0">
+              <a:solidFill>
+                <a:schemeClr val="bg1"/>
+              </a:solidFill>
+            </a:endParaRPr>
+          </a:p>
+          <a:p>
+            <a:r>
+              <a:rPr lang="de-DE" dirty="0" smtClean="0">
+                <a:solidFill>
+                  <a:schemeClr val="bg1"/>
+                </a:solidFill>
+              </a:rPr>
+              <a:t>Ein Storage Account wird für Datenablage in der Cloud benötigt</a:t>
+            </a:r>
+            <a:endParaRPr lang="de-DE" dirty="0" smtClean="0">
+              <a:solidFill>
+                <a:schemeClr val="bg1"/>
+              </a:solidFill>
+            </a:endParaRPr>
+          </a:p>
+        </p:txBody>
+      </p:sp>
+      <p:pic>
+        <p:nvPicPr>
+          <p:cNvPr id="4" name="Grafik 3"/>
+          <p:cNvPicPr>
+            <a:picLocks noChangeAspect="1"/>
+          </p:cNvPicPr>
+          <p:nvPr/>
+        </p:nvPicPr>
+        <p:blipFill>
+          <a:blip r:embed="rId2">
+            <a:extLst>
+              <a:ext uri="{28A0092B-C50C-407E-A947-70E740481C1C}">
+                <a14:useLocalDpi xmlns:a14="http://schemas.microsoft.com/office/drawing/2010/main" val="0"/>
+              </a:ext>
+            </a:extLst>
+          </a:blip>
+          <a:stretch>
+            <a:fillRect/>
+          </a:stretch>
+        </p:blipFill>
+        <p:spPr>
+          <a:xfrm>
+            <a:off x="1066800" y="1825624"/>
+            <a:ext cx="10058400" cy="3163193"/>
+          </a:xfrm>
+          <a:prstGeom prst="rect">
+            <a:avLst/>
+          </a:prstGeom>
+        </p:spPr>
+      </p:pic>
     </p:spTree>
     <p:extLst>
       <p:ext uri="{BB962C8B-B14F-4D97-AF65-F5344CB8AC3E}">
@@ -3804,23 +4452,7 @@
                   <a:schemeClr val="bg1"/>
                 </a:solidFill>
               </a:rPr>
-              <a:t>Demo 2: </a:t>
-            </a:r>
-            <a:r>
-              <a:rPr lang="de-DE" dirty="0" err="1" smtClean="0">
-                <a:solidFill>
-                  <a:schemeClr val="bg1"/>
-                </a:solidFill>
-              </a:rPr>
-              <a:t>Elastic</a:t>
-            </a:r>
-            <a:r>
-              <a:rPr lang="de-DE" dirty="0" smtClean="0">
-                <a:solidFill>
-                  <a:schemeClr val="bg1"/>
-                </a:solidFill>
-              </a:rPr>
-              <a:t> Search</a:t>
+              <a:t>Azure Queue Demo: Messenger</a:t>
             </a:r>
             <a:endParaRPr lang="de-DE" dirty="0">
               <a:solidFill>
@@ -3852,6 +4484,279 @@
           </a:bodyPr>
           <a:lstStyle/>
           <a:p>
+            <a:r>
+              <a:rPr lang="de-DE" dirty="0">
+                <a:solidFill>
+                  <a:schemeClr val="bg1"/>
+                </a:solidFill>
+              </a:rPr>
+              <a:t>Beim Start des Clients wird </a:t>
+            </a:r>
+            <a:r>
+              <a:rPr lang="de-DE" dirty="0" smtClean="0">
+                <a:solidFill>
+                  <a:schemeClr val="bg1"/>
+                </a:solidFill>
+              </a:rPr>
+              <a:t>ein </a:t>
+            </a:r>
+            <a:r>
+              <a:rPr lang="de-DE" dirty="0">
+                <a:solidFill>
+                  <a:schemeClr val="bg1"/>
+                </a:solidFill>
+              </a:rPr>
+              <a:t>Benutzername eingegeben</a:t>
+            </a:r>
+          </a:p>
+          <a:p>
+            <a:r>
+              <a:rPr lang="de-DE" dirty="0">
+                <a:solidFill>
+                  <a:schemeClr val="bg1"/>
+                </a:solidFill>
+              </a:rPr>
+              <a:t>Alle </a:t>
+            </a:r>
+            <a:r>
+              <a:rPr lang="de-DE" dirty="0" smtClean="0">
+                <a:solidFill>
+                  <a:schemeClr val="bg1"/>
+                </a:solidFill>
+              </a:rPr>
+              <a:t>wartenden Nachrichten für diesen Benutzer werden nach </a:t>
+            </a:r>
+            <a:r>
+              <a:rPr lang="de-DE" dirty="0">
+                <a:solidFill>
+                  <a:schemeClr val="bg1"/>
+                </a:solidFill>
+              </a:rPr>
+              <a:t>dem </a:t>
+            </a:r>
+            <a:r>
+              <a:rPr lang="de-DE" dirty="0" smtClean="0">
+                <a:solidFill>
+                  <a:schemeClr val="bg1"/>
+                </a:solidFill>
+              </a:rPr>
+              <a:t>Start angezeigt</a:t>
+            </a:r>
+            <a:endParaRPr lang="de-DE" dirty="0">
+              <a:solidFill>
+                <a:schemeClr val="bg1"/>
+              </a:solidFill>
+            </a:endParaRPr>
+          </a:p>
+          <a:p>
+            <a:r>
+              <a:rPr lang="de-DE" dirty="0" smtClean="0">
+                <a:solidFill>
+                  <a:schemeClr val="bg1"/>
+                </a:solidFill>
+              </a:rPr>
+              <a:t>Nachrichten können an beliebige andere Benutzer gesendet werden</a:t>
+            </a:r>
+          </a:p>
+          <a:p>
+            <a:endParaRPr lang="de-DE" dirty="0">
+              <a:solidFill>
+                <a:schemeClr val="bg1"/>
+              </a:solidFill>
+            </a:endParaRPr>
+          </a:p>
+          <a:p>
+            <a:pPr marL="0" indent="0">
+              <a:buNone/>
+            </a:pPr>
+            <a:r>
+              <a:rPr lang="de-DE" dirty="0" smtClean="0">
+                <a:solidFill>
+                  <a:schemeClr val="bg1"/>
+                </a:solidFill>
+                <a:latin typeface="Consolas" panose="020B0609020204030204" pitchFamily="49" charset="0"/>
+              </a:rPr>
+              <a:t>&gt; </a:t>
+            </a:r>
+            <a:r>
+              <a:rPr lang="de-DE" dirty="0" err="1" smtClean="0">
+                <a:solidFill>
+                  <a:schemeClr val="bg1"/>
+                </a:solidFill>
+                <a:latin typeface="Consolas" panose="020B0609020204030204" pitchFamily="49" charset="0"/>
+              </a:rPr>
+              <a:t>messenger</a:t>
+            </a:r>
+            <a:r>
+              <a:rPr lang="de-DE" dirty="0" smtClean="0">
+                <a:solidFill>
+                  <a:schemeClr val="bg1"/>
+                </a:solidFill>
+                <a:latin typeface="Consolas" panose="020B0609020204030204" pitchFamily="49" charset="0"/>
+              </a:rPr>
+              <a:t> </a:t>
+            </a:r>
+            <a:r>
+              <a:rPr lang="de-DE" dirty="0" err="1" smtClean="0">
+                <a:solidFill>
+                  <a:schemeClr val="bg1"/>
+                </a:solidFill>
+                <a:latin typeface="Consolas" panose="020B0609020204030204" pitchFamily="49" charset="0"/>
+              </a:rPr>
+              <a:t>henger</a:t>
+            </a:r>
+            <a:endParaRPr lang="de-DE" dirty="0" smtClean="0">
+              <a:solidFill>
+                <a:schemeClr val="bg1"/>
+              </a:solidFill>
+              <a:latin typeface="Consolas" panose="020B0609020204030204" pitchFamily="49" charset="0"/>
+            </a:endParaRPr>
+          </a:p>
+          <a:p>
+            <a:pPr marL="0" indent="0">
+              <a:buNone/>
+            </a:pPr>
+            <a:r>
+              <a:rPr lang="de-DE" dirty="0" smtClean="0">
+                <a:solidFill>
+                  <a:schemeClr val="bg1"/>
+                </a:solidFill>
+                <a:latin typeface="Consolas" panose="020B0609020204030204" pitchFamily="49" charset="0"/>
+              </a:rPr>
+              <a:t>&gt; 17:15 </a:t>
+            </a:r>
+            <a:r>
+              <a:rPr lang="de-DE" dirty="0" err="1" smtClean="0">
+                <a:solidFill>
+                  <a:schemeClr val="bg1"/>
+                </a:solidFill>
+                <a:latin typeface="Consolas" panose="020B0609020204030204" pitchFamily="49" charset="0"/>
+              </a:rPr>
+              <a:t>tahic</a:t>
+            </a:r>
+            <a:r>
+              <a:rPr lang="de-DE" dirty="0" smtClean="0">
+                <a:solidFill>
+                  <a:schemeClr val="bg1"/>
+                </a:solidFill>
+                <a:latin typeface="Consolas" panose="020B0609020204030204" pitchFamily="49" charset="0"/>
+              </a:rPr>
+              <a:t>: hey dicker!</a:t>
+            </a:r>
+          </a:p>
+          <a:p>
+            <a:pPr marL="0" indent="0">
+              <a:buNone/>
+            </a:pPr>
+            <a:r>
+              <a:rPr lang="de-DE" dirty="0" smtClean="0">
+                <a:solidFill>
+                  <a:schemeClr val="bg1"/>
+                </a:solidFill>
+                <a:latin typeface="Consolas" panose="020B0609020204030204" pitchFamily="49" charset="0"/>
+              </a:rPr>
+              <a:t>&gt; </a:t>
+            </a:r>
+            <a:r>
+              <a:rPr lang="de-DE" dirty="0" err="1" smtClean="0">
+                <a:solidFill>
+                  <a:schemeClr val="bg1"/>
+                </a:solidFill>
+                <a:latin typeface="Consolas" panose="020B0609020204030204" pitchFamily="49" charset="0"/>
+              </a:rPr>
+              <a:t>tahic</a:t>
+            </a:r>
+            <a:r>
+              <a:rPr lang="de-DE" dirty="0" smtClean="0">
+                <a:solidFill>
+                  <a:schemeClr val="bg1"/>
+                </a:solidFill>
+                <a:latin typeface="Consolas" panose="020B0609020204030204" pitchFamily="49" charset="0"/>
+              </a:rPr>
+              <a:t> </a:t>
+            </a:r>
+            <a:r>
+              <a:rPr lang="de-DE" dirty="0" err="1" smtClean="0">
+                <a:solidFill>
+                  <a:schemeClr val="bg1"/>
+                </a:solidFill>
+                <a:latin typeface="Consolas" panose="020B0609020204030204" pitchFamily="49" charset="0"/>
+              </a:rPr>
+              <a:t>eyyy</a:t>
+            </a:r>
+            <a:r>
+              <a:rPr lang="de-DE" dirty="0" smtClean="0">
+                <a:solidFill>
+                  <a:schemeClr val="bg1"/>
+                </a:solidFill>
+                <a:latin typeface="Consolas" panose="020B0609020204030204" pitchFamily="49" charset="0"/>
+              </a:rPr>
+              <a:t> was geht?</a:t>
+            </a:r>
+            <a:endParaRPr lang="de-DE" dirty="0" smtClean="0">
+              <a:solidFill>
+                <a:schemeClr val="bg1"/>
+              </a:solidFill>
+              <a:latin typeface="Consolas" panose="020B0609020204030204" pitchFamily="49" charset="0"/>
+            </a:endParaRPr>
+          </a:p>
+          <a:p>
+            <a:pPr marL="0" indent="0">
+              <a:buNone/>
+            </a:pPr>
+            <a:r>
+              <a:rPr lang="de-DE" dirty="0" smtClean="0">
+                <a:solidFill>
+                  <a:schemeClr val="bg1"/>
+                </a:solidFill>
+                <a:latin typeface="Consolas" panose="020B0609020204030204" pitchFamily="49" charset="0"/>
+              </a:rPr>
+              <a:t>&gt; 17:16 </a:t>
+            </a:r>
+            <a:r>
+              <a:rPr lang="de-DE" dirty="0" err="1">
+                <a:solidFill>
+                  <a:schemeClr val="bg1"/>
+                </a:solidFill>
+                <a:latin typeface="Consolas" panose="020B0609020204030204" pitchFamily="49" charset="0"/>
+              </a:rPr>
+              <a:t>tahic</a:t>
+            </a:r>
+            <a:r>
+              <a:rPr lang="de-DE" dirty="0">
+                <a:solidFill>
+                  <a:schemeClr val="bg1"/>
+                </a:solidFill>
+                <a:latin typeface="Consolas" panose="020B0609020204030204" pitchFamily="49" charset="0"/>
+              </a:rPr>
+              <a:t>: </a:t>
+            </a:r>
+            <a:r>
+              <a:rPr lang="de-DE" dirty="0" err="1" smtClean="0">
+                <a:solidFill>
+                  <a:schemeClr val="bg1"/>
+                </a:solidFill>
+                <a:latin typeface="Consolas" panose="020B0609020204030204" pitchFamily="49" charset="0"/>
+              </a:rPr>
+              <a:t>wallah</a:t>
+            </a:r>
+            <a:r>
+              <a:rPr lang="de-DE" dirty="0" smtClean="0">
+                <a:solidFill>
+                  <a:schemeClr val="bg1"/>
+                </a:solidFill>
+                <a:latin typeface="Consolas" panose="020B0609020204030204" pitchFamily="49" charset="0"/>
+              </a:rPr>
+              <a:t>, nix dicker</a:t>
+            </a:r>
+            <a:endParaRPr lang="de-DE" dirty="0">
+              <a:solidFill>
+                <a:schemeClr val="bg1"/>
+              </a:solidFill>
+              <a:latin typeface="Consolas" panose="020B0609020204030204" pitchFamily="49" charset="0"/>
+            </a:endParaRPr>
+          </a:p>
+          <a:p>
             <a:pPr marL="0" indent="0">
               <a:buNone/>
             </a:pPr>
@@ -3883,18 +4788,636 @@
             </a:endParaRPr>
           </a:p>
           <a:p>
+            <a:endParaRPr lang="de-DE" dirty="0" smtClean="0">
+              <a:solidFill>
+                <a:schemeClr val="bg1"/>
+              </a:solidFill>
+            </a:endParaRPr>
+          </a:p>
+          <a:p>
+            <a:endParaRPr lang="de-DE" dirty="0" smtClean="0">
+              <a:solidFill>
+                <a:schemeClr val="bg1"/>
+              </a:solidFill>
+            </a:endParaRPr>
+          </a:p>
+        </p:txBody>
+      </p:sp>
+    </p:spTree>
+    <p:extLst>
+      <p:ext uri="{BB962C8B-B14F-4D97-AF65-F5344CB8AC3E}">
+        <p14:creationId xmlns:p14="http://schemas.microsoft.com/office/powerpoint/2010/main" val="3986805743"/>
+      </p:ext>
+    </p:extLst>
+  </p:cSld>
+  <p:clrMapOvr>
+    <a:masterClrMapping/>
+  </p:clrMapOvr>
+  <p:timing>
+    <p:tnLst>
+      <p:par>
+        <p:cTn id="1" dur="indefinite" restart="never" nodeType="tmRoot"/>
+      </p:par>
+    </p:tnLst>
+  </p:timing>
+</p:sld>
+</file>
+
+<file path=ppt/slides/slide14.xml><?xml version="1.0" encoding="utf-8"?>
+<p:sld xmlns:a="http://schemas.openxmlformats.org/drawingml/2006/main" xmlns:r="http://schemas.openxmlformats.org/officeDocument/2006/relationships" xmlns:p="http://schemas.openxmlformats.org/presentationml/2006/main">
+  <p:cSld>
+    <p:bg>
+      <p:bgPr>
+        <a:solidFill>
+          <a:schemeClr val="tx1">
+            <a:lumMod val="75000"/>
+            <a:lumOff val="25000"/>
+          </a:schemeClr>
+        </a:solidFill>
+        <a:effectLst/>
+      </p:bgPr>
+    </p:bg>
+    <p:spTree>
+      <p:nvGrpSpPr>
+        <p:cNvPr id="1" name=""/>
+        <p:cNvGrpSpPr/>
+        <p:nvPr/>
+      </p:nvGrpSpPr>
+      <p:grpSpPr>
+        <a:xfrm>
+          <a:off x="0" y="0"/>
+          <a:ext cx="0" cy="0"/>
+          <a:chOff x="0" y="0"/>
+          <a:chExt cx="0" cy="0"/>
+        </a:xfrm>
+      </p:grpSpPr>
+      <p:sp>
+        <p:nvSpPr>
+          <p:cNvPr id="2" name="Titel 1"/>
+          <p:cNvSpPr>
+            <a:spLocks noGrp="1"/>
+          </p:cNvSpPr>
+          <p:nvPr>
+            <p:ph type="title"/>
+          </p:nvPr>
+        </p:nvSpPr>
+        <p:spPr/>
+        <p:txBody>
+          <a:bodyPr/>
+          <a:lstStyle/>
+          <a:p>
+            <a:r>
+              <a:rPr lang="de-DE" dirty="0" smtClean="0">
+                <a:solidFill>
+                  <a:schemeClr val="bg1"/>
+                </a:solidFill>
+              </a:rPr>
+              <a:t>Azure </a:t>
+            </a:r>
+            <a:r>
+              <a:rPr lang="de-DE" dirty="0" err="1" smtClean="0">
+                <a:solidFill>
+                  <a:schemeClr val="bg1"/>
+                </a:solidFill>
+              </a:rPr>
+              <a:t>Blob</a:t>
+            </a:r>
+            <a:r>
+              <a:rPr lang="de-DE" dirty="0" smtClean="0">
+                <a:solidFill>
+                  <a:schemeClr val="bg1"/>
+                </a:solidFill>
+              </a:rPr>
+              <a:t> Demo: </a:t>
+            </a:r>
+            <a:r>
+              <a:rPr lang="de-DE" dirty="0" err="1" smtClean="0">
+                <a:solidFill>
+                  <a:schemeClr val="bg1"/>
+                </a:solidFill>
+              </a:rPr>
+              <a:t>DropBox</a:t>
+            </a:r>
+            <a:endParaRPr lang="de-DE" dirty="0">
+              <a:solidFill>
+                <a:schemeClr val="bg1"/>
+              </a:solidFill>
+            </a:endParaRPr>
+          </a:p>
+        </p:txBody>
+      </p:sp>
+      <p:sp>
+        <p:nvSpPr>
+          <p:cNvPr id="3" name="Inhaltsplatzhalter 2"/>
+          <p:cNvSpPr>
+            <a:spLocks noGrp="1"/>
+          </p:cNvSpPr>
+          <p:nvPr>
+            <p:ph idx="1"/>
+          </p:nvPr>
+        </p:nvSpPr>
+        <p:spPr>
+          <a:xfrm>
+            <a:off x="838200" y="1825624"/>
+            <a:ext cx="10515600" cy="4653329"/>
+          </a:xfrm>
+        </p:spPr>
+        <p:txBody>
+          <a:bodyPr>
+            <a:normAutofit/>
+          </a:bodyPr>
+          <a:lstStyle/>
+          <a:p>
+            <a:r>
+              <a:rPr lang="de-DE" dirty="0" smtClean="0">
+                <a:solidFill>
+                  <a:schemeClr val="bg1"/>
+                </a:solidFill>
+              </a:rPr>
+              <a:t>Ein einfacher </a:t>
+            </a:r>
+            <a:r>
+              <a:rPr lang="de-DE" dirty="0" err="1" smtClean="0">
+                <a:solidFill>
+                  <a:schemeClr val="bg1"/>
+                </a:solidFill>
+              </a:rPr>
+              <a:t>DropBox</a:t>
+            </a:r>
+            <a:r>
+              <a:rPr lang="de-DE" dirty="0" smtClean="0">
+                <a:solidFill>
+                  <a:schemeClr val="bg1"/>
+                </a:solidFill>
+              </a:rPr>
+              <a:t> Klon zum Synchronisieren von Dateien</a:t>
+            </a:r>
+          </a:p>
+          <a:p>
+            <a:r>
+              <a:rPr lang="de-DE" dirty="0" smtClean="0">
+                <a:solidFill>
+                  <a:schemeClr val="bg1"/>
+                </a:solidFill>
+              </a:rPr>
+              <a:t>Kopiert alle Dateien aus der Cloud in das </a:t>
+            </a:r>
+            <a:r>
+              <a:rPr lang="de-DE" dirty="0" err="1" smtClean="0">
+                <a:solidFill>
+                  <a:schemeClr val="bg1"/>
+                </a:solidFill>
+              </a:rPr>
+              <a:t>DropBox</a:t>
+            </a:r>
+            <a:r>
+              <a:rPr lang="de-DE" dirty="0" smtClean="0">
+                <a:solidFill>
+                  <a:schemeClr val="bg1"/>
+                </a:solidFill>
+              </a:rPr>
+              <a:t> Verzeichnis, wenn diese dort noch nicht existieren und umgekehrt</a:t>
+            </a:r>
+          </a:p>
+          <a:p>
+            <a:r>
+              <a:rPr lang="de-DE" dirty="0" smtClean="0">
+                <a:solidFill>
+                  <a:schemeClr val="bg1"/>
+                </a:solidFill>
+              </a:rPr>
+              <a:t>Änderungen und Löschen von Dateien ignorieren wir</a:t>
+            </a:r>
+            <a:endParaRPr lang="de-DE" dirty="0">
+              <a:solidFill>
+                <a:schemeClr val="bg1"/>
+              </a:solidFill>
+            </a:endParaRPr>
+          </a:p>
+          <a:p>
             <a:pPr marL="0" indent="0">
               <a:buNone/>
             </a:pPr>
+            <a:endParaRPr lang="de-DE" dirty="0" smtClean="0">
+              <a:solidFill>
+                <a:schemeClr val="bg1"/>
+              </a:solidFill>
+            </a:endParaRPr>
+          </a:p>
+          <a:p>
+            <a:endParaRPr lang="de-DE" dirty="0" smtClean="0">
+              <a:solidFill>
+                <a:schemeClr val="bg1"/>
+              </a:solidFill>
+            </a:endParaRPr>
+          </a:p>
+          <a:p>
+            <a:endParaRPr lang="de-DE" dirty="0" smtClean="0">
+              <a:solidFill>
+                <a:schemeClr val="bg1"/>
+              </a:solidFill>
+            </a:endParaRPr>
+          </a:p>
+          <a:p>
+            <a:endParaRPr lang="de-DE" dirty="0" smtClean="0">
+              <a:solidFill>
+                <a:schemeClr val="bg1"/>
+              </a:solidFill>
+            </a:endParaRPr>
+          </a:p>
+          <a:p>
+            <a:endParaRPr lang="de-DE" dirty="0" smtClean="0">
+              <a:solidFill>
+                <a:schemeClr val="bg1"/>
+              </a:solidFill>
+            </a:endParaRPr>
+          </a:p>
+          <a:p>
+            <a:endParaRPr lang="de-DE" dirty="0" smtClean="0">
+              <a:solidFill>
+                <a:schemeClr val="bg1"/>
+              </a:solidFill>
+            </a:endParaRPr>
+          </a:p>
+        </p:txBody>
+      </p:sp>
+    </p:spTree>
+    <p:extLst>
+      <p:ext uri="{BB962C8B-B14F-4D97-AF65-F5344CB8AC3E}">
+        <p14:creationId xmlns:p14="http://schemas.microsoft.com/office/powerpoint/2010/main" val="271451367"/>
+      </p:ext>
+    </p:extLst>
+  </p:cSld>
+  <p:clrMapOvr>
+    <a:masterClrMapping/>
+  </p:clrMapOvr>
+  <p:timing>
+    <p:tnLst>
+      <p:par>
+        <p:cTn id="1" dur="indefinite" restart="never" nodeType="tmRoot"/>
+      </p:par>
+    </p:tnLst>
+  </p:timing>
+</p:sld>
+</file>
+
+<file path=ppt/slides/slide15.xml><?xml version="1.0" encoding="utf-8"?>
+<p:sld xmlns:a="http://schemas.openxmlformats.org/drawingml/2006/main" xmlns:r="http://schemas.openxmlformats.org/officeDocument/2006/relationships" xmlns:p="http://schemas.openxmlformats.org/presentationml/2006/main">
+  <p:cSld>
+    <p:bg>
+      <p:bgPr>
+        <a:solidFill>
+          <a:schemeClr val="tx1">
+            <a:lumMod val="75000"/>
+            <a:lumOff val="25000"/>
+          </a:schemeClr>
+        </a:solidFill>
+        <a:effectLst/>
+      </p:bgPr>
+    </p:bg>
+    <p:spTree>
+      <p:nvGrpSpPr>
+        <p:cNvPr id="1" name=""/>
+        <p:cNvGrpSpPr/>
+        <p:nvPr/>
+      </p:nvGrpSpPr>
+      <p:grpSpPr>
+        <a:xfrm>
+          <a:off x="0" y="0"/>
+          <a:ext cx="0" cy="0"/>
+          <a:chOff x="0" y="0"/>
+          <a:chExt cx="0" cy="0"/>
+        </a:xfrm>
+      </p:grpSpPr>
+      <p:sp>
+        <p:nvSpPr>
+          <p:cNvPr id="2" name="Titel 1"/>
+          <p:cNvSpPr>
+            <a:spLocks noGrp="1"/>
+          </p:cNvSpPr>
+          <p:nvPr>
+            <p:ph type="title"/>
+          </p:nvPr>
+        </p:nvSpPr>
+        <p:spPr/>
+        <p:txBody>
+          <a:bodyPr/>
+          <a:lstStyle/>
+          <a:p>
+            <a:r>
+              <a:rPr lang="de-DE" dirty="0" smtClean="0">
+                <a:solidFill>
+                  <a:schemeClr val="bg1"/>
+                </a:solidFill>
+              </a:rPr>
+              <a:t>Landau Media Azure Portal</a:t>
+            </a:r>
             <a:endParaRPr lang="de-DE" dirty="0">
               <a:solidFill>
                 <a:schemeClr val="bg1"/>
               </a:solidFill>
             </a:endParaRPr>
           </a:p>
-          <a:p>
-            <a:r>
-              <a:rPr lang="de-DE" smtClean="0">
+        </p:txBody>
+      </p:sp>
+      <p:sp>
+        <p:nvSpPr>
+          <p:cNvPr id="3" name="Inhaltsplatzhalter 2"/>
+          <p:cNvSpPr>
+            <a:spLocks noGrp="1"/>
+          </p:cNvSpPr>
+          <p:nvPr>
+            <p:ph idx="1"/>
+          </p:nvPr>
+        </p:nvSpPr>
+        <p:spPr/>
+        <p:txBody>
+          <a:bodyPr>
+            <a:normAutofit/>
+          </a:bodyPr>
+          <a:lstStyle/>
+          <a:p>
+            <a:r>
+              <a:rPr lang="de-DE" dirty="0" smtClean="0">
+                <a:solidFill>
+                  <a:schemeClr val="bg1"/>
+                </a:solidFill>
+              </a:rPr>
+              <a:t>Zugangsdaten</a:t>
+            </a:r>
+            <a:r>
+              <a:rPr lang="de-DE" dirty="0">
+                <a:solidFill>
+                  <a:schemeClr val="bg1"/>
+                </a:solidFill>
+              </a:rPr>
+              <a:t>: https://</a:t>
+            </a:r>
+            <a:r>
+              <a:rPr lang="de-DE" dirty="0" smtClean="0">
+                <a:solidFill>
+                  <a:schemeClr val="bg1"/>
+                </a:solidFill>
+              </a:rPr>
+              <a:t>wiki.dev.local/w/Azure</a:t>
+            </a:r>
+          </a:p>
+          <a:p>
+            <a:r>
+              <a:rPr lang="de-DE" dirty="0">
+                <a:solidFill>
+                  <a:schemeClr val="bg1"/>
+                </a:solidFill>
+              </a:rPr>
+              <a:t>https://</a:t>
+            </a:r>
+            <a:r>
+              <a:rPr lang="de-DE" dirty="0" smtClean="0">
+                <a:solidFill>
+                  <a:schemeClr val="bg1"/>
+                </a:solidFill>
+              </a:rPr>
+              <a:t>portal.azure.com</a:t>
+            </a:r>
+          </a:p>
+          <a:p>
+            <a:endParaRPr lang="de-DE" dirty="0">
+              <a:solidFill>
+                <a:schemeClr val="bg1"/>
+              </a:solidFill>
+            </a:endParaRPr>
+          </a:p>
+          <a:p>
+            <a:r>
+              <a:rPr lang="de-DE" dirty="0">
+                <a:solidFill>
+                  <a:schemeClr val="bg1"/>
+                </a:solidFill>
+              </a:rPr>
+              <a:t>SQL Datenbanken: maprodsql.database.windows.net</a:t>
+            </a:r>
+          </a:p>
+          <a:p>
+            <a:r>
+              <a:rPr lang="de-DE" dirty="0" smtClean="0">
+                <a:solidFill>
+                  <a:schemeClr val="bg1"/>
+                </a:solidFill>
+              </a:rPr>
+              <a:t>Switch MA Website Production und Staging</a:t>
+            </a:r>
+          </a:p>
+          <a:p>
+            <a:r>
+              <a:rPr lang="de-DE" dirty="0" smtClean="0">
+                <a:solidFill>
+                  <a:schemeClr val="bg1"/>
+                </a:solidFill>
+              </a:rPr>
+              <a:t>Table Service (Queues)</a:t>
+            </a:r>
+          </a:p>
+          <a:p>
+            <a:r>
+              <a:rPr lang="de-DE" dirty="0" smtClean="0">
+                <a:solidFill>
+                  <a:schemeClr val="bg1"/>
+                </a:solidFill>
+              </a:rPr>
+              <a:t>Docker Container Repository</a:t>
+            </a:r>
+            <a:endParaRPr lang="de-DE" dirty="0" smtClean="0">
+              <a:solidFill>
+                <a:schemeClr val="bg1"/>
+              </a:solidFill>
+            </a:endParaRPr>
+          </a:p>
+        </p:txBody>
+      </p:sp>
+    </p:spTree>
+    <p:extLst>
+      <p:ext uri="{BB962C8B-B14F-4D97-AF65-F5344CB8AC3E}">
+        <p14:creationId xmlns:p14="http://schemas.microsoft.com/office/powerpoint/2010/main" val="2066830972"/>
+      </p:ext>
+    </p:extLst>
+  </p:cSld>
+  <p:clrMapOvr>
+    <a:masterClrMapping/>
+  </p:clrMapOvr>
+  <p:timing>
+    <p:tnLst>
+      <p:par>
+        <p:cTn id="1" dur="indefinite" restart="never" nodeType="tmRoot"/>
+      </p:par>
+    </p:tnLst>
+  </p:timing>
+</p:sld>
+</file>
+
+<file path=ppt/slides/slide16.xml><?xml version="1.0" encoding="utf-8"?>
+<p:sld xmlns:a="http://schemas.openxmlformats.org/drawingml/2006/main" xmlns:r="http://schemas.openxmlformats.org/officeDocument/2006/relationships" xmlns:p="http://schemas.openxmlformats.org/presentationml/2006/main">
+  <p:cSld>
+    <p:bg>
+      <p:bgPr>
+        <a:solidFill>
+          <a:schemeClr val="tx1">
+            <a:lumMod val="75000"/>
+            <a:lumOff val="25000"/>
+          </a:schemeClr>
+        </a:solidFill>
+        <a:effectLst/>
+      </p:bgPr>
+    </p:bg>
+    <p:spTree>
+      <p:nvGrpSpPr>
+        <p:cNvPr id="1" name=""/>
+        <p:cNvGrpSpPr/>
+        <p:nvPr/>
+      </p:nvGrpSpPr>
+      <p:grpSpPr>
+        <a:xfrm>
+          <a:off x="0" y="0"/>
+          <a:ext cx="0" cy="0"/>
+          <a:chOff x="0" y="0"/>
+          <a:chExt cx="0" cy="0"/>
+        </a:xfrm>
+      </p:grpSpPr>
+      <p:sp>
+        <p:nvSpPr>
+          <p:cNvPr id="2" name="Titel 1"/>
+          <p:cNvSpPr>
+            <a:spLocks noGrp="1"/>
+          </p:cNvSpPr>
+          <p:nvPr>
+            <p:ph type="title"/>
+          </p:nvPr>
+        </p:nvSpPr>
+        <p:spPr/>
+        <p:txBody>
+          <a:bodyPr/>
+          <a:lstStyle/>
+          <a:p>
+            <a:r>
+              <a:rPr lang="de-DE" dirty="0" err="1">
+                <a:solidFill>
+                  <a:schemeClr val="bg1"/>
+                </a:solidFill>
+              </a:rPr>
+              <a:t>Elastic</a:t>
+            </a:r>
+            <a:r>
+              <a:rPr lang="de-DE" dirty="0">
+                <a:solidFill>
+                  <a:schemeClr val="bg1"/>
+                </a:solidFill>
+              </a:rPr>
+              <a:t> Search </a:t>
+            </a:r>
+            <a:r>
+              <a:rPr lang="de-DE" dirty="0" smtClean="0">
+                <a:solidFill>
+                  <a:schemeClr val="bg1"/>
+                </a:solidFill>
+              </a:rPr>
+              <a:t>Demo</a:t>
+            </a:r>
+            <a:r>
+              <a:rPr lang="de-DE" dirty="0" smtClean="0">
+                <a:solidFill>
+                  <a:schemeClr val="bg1"/>
+                </a:solidFill>
+              </a:rPr>
+              <a:t>:</a:t>
+            </a:r>
+            <a:endParaRPr lang="de-DE" dirty="0">
+              <a:solidFill>
+                <a:schemeClr val="bg1"/>
+              </a:solidFill>
+            </a:endParaRPr>
+          </a:p>
+        </p:txBody>
+      </p:sp>
+      <p:sp>
+        <p:nvSpPr>
+          <p:cNvPr id="3" name="Inhaltsplatzhalter 2"/>
+          <p:cNvSpPr>
+            <a:spLocks noGrp="1"/>
+          </p:cNvSpPr>
+          <p:nvPr>
+            <p:ph idx="1"/>
+          </p:nvPr>
+        </p:nvSpPr>
+        <p:spPr>
+          <a:xfrm>
+            <a:off x="838200" y="1825624"/>
+            <a:ext cx="10515600" cy="4653329"/>
+          </a:xfrm>
+        </p:spPr>
+        <p:txBody>
+          <a:bodyPr>
+            <a:normAutofit/>
+          </a:bodyPr>
+          <a:lstStyle/>
+          <a:p>
+            <a:pPr marL="0" indent="0">
+              <a:buNone/>
+            </a:pPr>
+            <a:r>
+              <a:rPr lang="de-DE" dirty="0" smtClean="0">
+                <a:solidFill>
+                  <a:schemeClr val="bg1"/>
+                </a:solidFill>
+              </a:rPr>
+              <a:t>TODO</a:t>
+            </a:r>
+            <a:endParaRPr lang="de-DE" dirty="0" smtClean="0">
+              <a:solidFill>
+                <a:schemeClr val="bg1"/>
+              </a:solidFill>
+            </a:endParaRPr>
+          </a:p>
+          <a:p>
+            <a:endParaRPr lang="de-DE" dirty="0" smtClean="0">
+              <a:solidFill>
+                <a:schemeClr val="bg1"/>
+              </a:solidFill>
+            </a:endParaRPr>
+          </a:p>
+          <a:p>
+            <a:endParaRPr lang="de-DE" dirty="0" smtClean="0">
+              <a:solidFill>
+                <a:schemeClr val="bg1"/>
+              </a:solidFill>
+            </a:endParaRPr>
+          </a:p>
+          <a:p>
+            <a:endParaRPr lang="de-DE" dirty="0" smtClean="0">
+              <a:solidFill>
+                <a:schemeClr val="bg1"/>
+              </a:solidFill>
+            </a:endParaRPr>
+          </a:p>
+          <a:p>
+            <a:pPr marL="0" indent="0">
+              <a:buNone/>
+            </a:pPr>
+            <a:r>
+              <a:rPr lang="de-DE" dirty="0">
+                <a:solidFill>
+                  <a:schemeClr val="bg1"/>
+                </a:solidFill>
+              </a:rPr>
+              <a:t>* http://localhost:9200/</a:t>
+            </a:r>
+            <a:endParaRPr lang="de-DE" dirty="0">
+              <a:solidFill>
+                <a:schemeClr val="bg1"/>
+              </a:solidFill>
+            </a:endParaRPr>
+          </a:p>
+          <a:p>
+            <a:r>
+              <a:rPr lang="de-DE" dirty="0" smtClean="0">
                 <a:solidFill>
                   <a:schemeClr val="bg1"/>
                 </a:solidFill>
@@ -3904,20 +5427,12 @@
           </a:p>
           <a:p>
             <a:r>
-              <a:rPr lang="de-DE" smtClean="0">
-                <a:solidFill>
-                  <a:schemeClr val="bg1"/>
-                </a:solidFill>
-              </a:rPr>
-              <a:t>http</a:t>
-            </a:r>
-            <a:r>
-              <a:rPr lang="de-DE" dirty="0" smtClean="0">
-                <a:solidFill>
-                  <a:schemeClr val="bg1"/>
-                </a:solidFill>
-              </a:rPr>
-              <a:t>://localhost:5601/</a:t>
+              <a:rPr lang="de-DE" dirty="0" smtClean="0">
+                <a:solidFill>
+                  <a:schemeClr val="bg1"/>
+                </a:solidFill>
+              </a:rPr>
+              <a:t>http://localhost:5601/</a:t>
             </a:r>
           </a:p>
           <a:p>
@@ -4195,6 +5710,631 @@
                   <a:schemeClr val="bg1"/>
                 </a:solidFill>
               </a:rPr>
+              <a:t>.NET Core 2.1 &amp; .NET Framework 4.7.2</a:t>
+            </a:r>
+            <a:endParaRPr lang="de-DE" dirty="0">
+              <a:solidFill>
+                <a:schemeClr val="bg1"/>
+              </a:solidFill>
+            </a:endParaRPr>
+          </a:p>
+        </p:txBody>
+      </p:sp>
+      <p:sp>
+        <p:nvSpPr>
+          <p:cNvPr id="3" name="Inhaltsplatzhalter 2"/>
+          <p:cNvSpPr>
+            <a:spLocks noGrp="1"/>
+          </p:cNvSpPr>
+          <p:nvPr>
+            <p:ph idx="1"/>
+          </p:nvPr>
+        </p:nvSpPr>
+        <p:spPr/>
+        <p:txBody>
+          <a:bodyPr/>
+          <a:lstStyle/>
+          <a:p>
+            <a:pPr marL="0" indent="0">
+              <a:buNone/>
+            </a:pPr>
+            <a:endParaRPr lang="de-DE" dirty="0" smtClean="0">
+              <a:solidFill>
+                <a:schemeClr val="bg1"/>
+              </a:solidFill>
+            </a:endParaRPr>
+          </a:p>
+          <a:p>
+            <a:endParaRPr lang="de-DE" dirty="0">
+              <a:solidFill>
+                <a:schemeClr val="bg1"/>
+              </a:solidFill>
+            </a:endParaRPr>
+          </a:p>
+          <a:p>
+            <a:endParaRPr lang="de-DE" dirty="0" smtClean="0">
+              <a:solidFill>
+                <a:schemeClr val="bg1"/>
+              </a:solidFill>
+            </a:endParaRPr>
+          </a:p>
+          <a:p>
+            <a:endParaRPr lang="de-DE" dirty="0" smtClean="0">
+              <a:solidFill>
+                <a:schemeClr val="bg1"/>
+              </a:solidFill>
+            </a:endParaRPr>
+          </a:p>
+          <a:p>
+            <a:endParaRPr lang="de-DE" dirty="0">
+              <a:solidFill>
+                <a:schemeClr val="bg1"/>
+              </a:solidFill>
+            </a:endParaRPr>
+          </a:p>
+          <a:p>
+            <a:endParaRPr lang="de-DE" dirty="0" smtClean="0">
+              <a:solidFill>
+                <a:schemeClr val="bg1"/>
+              </a:solidFill>
+            </a:endParaRPr>
+          </a:p>
+          <a:p>
+            <a:endParaRPr lang="de-DE" dirty="0" smtClean="0">
+              <a:solidFill>
+                <a:schemeClr val="bg1"/>
+              </a:solidFill>
+            </a:endParaRPr>
+          </a:p>
+          <a:p>
+            <a:r>
+              <a:rPr lang="de-DE" dirty="0" smtClean="0">
+                <a:solidFill>
+                  <a:schemeClr val="bg1"/>
+                </a:solidFill>
+              </a:rPr>
+              <a:t>https://www.microsoft.com/net/download/windows</a:t>
+            </a:r>
+          </a:p>
+        </p:txBody>
+      </p:sp>
+      <p:pic>
+        <p:nvPicPr>
+          <p:cNvPr id="5" name="Grafik 4"/>
+          <p:cNvPicPr>
+            <a:picLocks noChangeAspect="1"/>
+          </p:cNvPicPr>
+          <p:nvPr/>
+        </p:nvPicPr>
+        <p:blipFill>
+          <a:blip r:embed="rId3">
+            <a:extLst>
+              <a:ext uri="{28A0092B-C50C-407E-A947-70E740481C1C}">
+                <a14:useLocalDpi xmlns:a14="http://schemas.microsoft.com/office/drawing/2010/main" val="0"/>
+              </a:ext>
+            </a:extLst>
+          </a:blip>
+          <a:stretch>
+            <a:fillRect/>
+          </a:stretch>
+        </p:blipFill>
+        <p:spPr>
+          <a:xfrm>
+            <a:off x="1066800" y="1825625"/>
+            <a:ext cx="10058400" cy="3281119"/>
+          </a:xfrm>
+          <a:prstGeom prst="rect">
+            <a:avLst/>
+          </a:prstGeom>
+        </p:spPr>
+      </p:pic>
+    </p:spTree>
+    <p:extLst>
+      <p:ext uri="{BB962C8B-B14F-4D97-AF65-F5344CB8AC3E}">
+        <p14:creationId xmlns:p14="http://schemas.microsoft.com/office/powerpoint/2010/main" val="2276303486"/>
+      </p:ext>
+    </p:extLst>
+  </p:cSld>
+  <p:clrMapOvr>
+    <a:masterClrMapping/>
+  </p:clrMapOvr>
+  <p:timing>
+    <p:tnLst>
+      <p:par>
+        <p:cTn id="1" dur="indefinite" restart="never" nodeType="tmRoot"/>
+      </p:par>
+    </p:tnLst>
+  </p:timing>
+</p:sld>
+</file>
+
+<file path=ppt/slides/slide4.xml><?xml version="1.0" encoding="utf-8"?>
+<p:sld xmlns:a="http://schemas.openxmlformats.org/drawingml/2006/main" xmlns:r="http://schemas.openxmlformats.org/officeDocument/2006/relationships" xmlns:p="http://schemas.openxmlformats.org/presentationml/2006/main">
+  <p:cSld>
+    <p:bg>
+      <p:bgPr>
+        <a:solidFill>
+          <a:schemeClr val="tx1">
+            <a:lumMod val="75000"/>
+            <a:lumOff val="25000"/>
+          </a:schemeClr>
+        </a:solidFill>
+        <a:effectLst/>
+      </p:bgPr>
+    </p:bg>
+    <p:spTree>
+      <p:nvGrpSpPr>
+        <p:cNvPr id="1" name=""/>
+        <p:cNvGrpSpPr/>
+        <p:nvPr/>
+      </p:nvGrpSpPr>
+      <p:grpSpPr>
+        <a:xfrm>
+          <a:off x="0" y="0"/>
+          <a:ext cx="0" cy="0"/>
+          <a:chOff x="0" y="0"/>
+          <a:chExt cx="0" cy="0"/>
+        </a:xfrm>
+      </p:grpSpPr>
+      <p:sp>
+        <p:nvSpPr>
+          <p:cNvPr id="2" name="Titel 1"/>
+          <p:cNvSpPr>
+            <a:spLocks noGrp="1"/>
+          </p:cNvSpPr>
+          <p:nvPr>
+            <p:ph type="title"/>
+          </p:nvPr>
+        </p:nvSpPr>
+        <p:spPr/>
+        <p:txBody>
+          <a:bodyPr/>
+          <a:lstStyle/>
+          <a:p>
+            <a:r>
+              <a:rPr lang="de-DE" dirty="0" smtClean="0">
+                <a:solidFill>
+                  <a:schemeClr val="bg1"/>
+                </a:solidFill>
+              </a:rPr>
+              <a:t>Docker </a:t>
+            </a:r>
+            <a:r>
+              <a:rPr lang="de-DE" dirty="0" err="1" smtClean="0">
+                <a:solidFill>
+                  <a:schemeClr val="bg1"/>
+                </a:solidFill>
+              </a:rPr>
+              <a:t>for</a:t>
+            </a:r>
+            <a:r>
+              <a:rPr lang="de-DE" dirty="0" smtClean="0">
+                <a:solidFill>
+                  <a:schemeClr val="bg1"/>
+                </a:solidFill>
+              </a:rPr>
+              <a:t> Windows 🐳</a:t>
+            </a:r>
+            <a:endParaRPr lang="de-DE" dirty="0">
+              <a:solidFill>
+                <a:schemeClr val="bg1"/>
+              </a:solidFill>
+            </a:endParaRPr>
+          </a:p>
+        </p:txBody>
+      </p:sp>
+      <p:sp>
+        <p:nvSpPr>
+          <p:cNvPr id="3" name="Inhaltsplatzhalter 2"/>
+          <p:cNvSpPr>
+            <a:spLocks noGrp="1"/>
+          </p:cNvSpPr>
+          <p:nvPr>
+            <p:ph idx="1"/>
+          </p:nvPr>
+        </p:nvSpPr>
+        <p:spPr/>
+        <p:txBody>
+          <a:bodyPr>
+            <a:normAutofit/>
+          </a:bodyPr>
+          <a:lstStyle/>
+          <a:p>
+            <a:pPr marL="0" indent="0">
+              <a:buNone/>
+            </a:pPr>
+            <a:endParaRPr lang="de-DE" dirty="0" smtClean="0">
+              <a:solidFill>
+                <a:schemeClr val="bg1"/>
+              </a:solidFill>
+            </a:endParaRPr>
+          </a:p>
+          <a:p>
+            <a:endParaRPr lang="de-DE" dirty="0">
+              <a:solidFill>
+                <a:schemeClr val="bg1"/>
+              </a:solidFill>
+            </a:endParaRPr>
+          </a:p>
+          <a:p>
+            <a:endParaRPr lang="de-DE" dirty="0" smtClean="0">
+              <a:solidFill>
+                <a:schemeClr val="bg1"/>
+              </a:solidFill>
+            </a:endParaRPr>
+          </a:p>
+          <a:p>
+            <a:endParaRPr lang="de-DE" dirty="0" smtClean="0">
+              <a:solidFill>
+                <a:schemeClr val="bg1"/>
+              </a:solidFill>
+            </a:endParaRPr>
+          </a:p>
+          <a:p>
+            <a:endParaRPr lang="de-DE" dirty="0">
+              <a:solidFill>
+                <a:schemeClr val="bg1"/>
+              </a:solidFill>
+            </a:endParaRPr>
+          </a:p>
+          <a:p>
+            <a:endParaRPr lang="de-DE" dirty="0" smtClean="0">
+              <a:solidFill>
+                <a:schemeClr val="bg1"/>
+              </a:solidFill>
+            </a:endParaRPr>
+          </a:p>
+          <a:p>
+            <a:r>
+              <a:rPr lang="de-DE" dirty="0" smtClean="0">
+                <a:solidFill>
+                  <a:schemeClr val="bg1"/>
+                </a:solidFill>
+              </a:rPr>
+              <a:t>Anmelden und DOCKER ID mit Passwort erzeugen</a:t>
+            </a:r>
+          </a:p>
+          <a:p>
+            <a:r>
+              <a:rPr lang="de-DE" dirty="0" smtClean="0">
+                <a:solidFill>
+                  <a:schemeClr val="bg1"/>
+                </a:solidFill>
+              </a:rPr>
+              <a:t>https://www.docker.com/docker-windows</a:t>
+            </a:r>
+          </a:p>
+        </p:txBody>
+      </p:sp>
+      <p:pic>
+        <p:nvPicPr>
+          <p:cNvPr id="4" name="Grafik 3"/>
+          <p:cNvPicPr>
+            <a:picLocks noChangeAspect="1"/>
+          </p:cNvPicPr>
+          <p:nvPr/>
+        </p:nvPicPr>
+        <p:blipFill>
+          <a:blip r:embed="rId2">
+            <a:extLst>
+              <a:ext uri="{28A0092B-C50C-407E-A947-70E740481C1C}">
+                <a14:useLocalDpi xmlns:a14="http://schemas.microsoft.com/office/drawing/2010/main" val="0"/>
+              </a:ext>
+            </a:extLst>
+          </a:blip>
+          <a:stretch>
+            <a:fillRect/>
+          </a:stretch>
+        </p:blipFill>
+        <p:spPr>
+          <a:xfrm>
+            <a:off x="1066800" y="1825625"/>
+            <a:ext cx="10058400" cy="2511131"/>
+          </a:xfrm>
+          <a:prstGeom prst="rect">
+            <a:avLst/>
+          </a:prstGeom>
+        </p:spPr>
+      </p:pic>
+    </p:spTree>
+    <p:extLst>
+      <p:ext uri="{BB962C8B-B14F-4D97-AF65-F5344CB8AC3E}">
+        <p14:creationId xmlns:p14="http://schemas.microsoft.com/office/powerpoint/2010/main" val="1518563153"/>
+      </p:ext>
+    </p:extLst>
+  </p:cSld>
+  <p:clrMapOvr>
+    <a:masterClrMapping/>
+  </p:clrMapOvr>
+  <p:timing>
+    <p:tnLst>
+      <p:par>
+        <p:cTn id="1" dur="indefinite" restart="never" nodeType="tmRoot"/>
+      </p:par>
+    </p:tnLst>
+  </p:timing>
+</p:sld>
+</file>
+
+<file path=ppt/slides/slide5.xml><?xml version="1.0" encoding="utf-8"?>
+<p:sld xmlns:a="http://schemas.openxmlformats.org/drawingml/2006/main" xmlns:r="http://schemas.openxmlformats.org/officeDocument/2006/relationships" xmlns:p="http://schemas.openxmlformats.org/presentationml/2006/main">
+  <p:cSld>
+    <p:bg>
+      <p:bgPr>
+        <a:solidFill>
+          <a:schemeClr val="tx1">
+            <a:lumMod val="75000"/>
+            <a:lumOff val="25000"/>
+          </a:schemeClr>
+        </a:solidFill>
+        <a:effectLst/>
+      </p:bgPr>
+    </p:bg>
+    <p:spTree>
+      <p:nvGrpSpPr>
+        <p:cNvPr id="1" name=""/>
+        <p:cNvGrpSpPr/>
+        <p:nvPr/>
+      </p:nvGrpSpPr>
+      <p:grpSpPr>
+        <a:xfrm>
+          <a:off x="0" y="0"/>
+          <a:ext cx="0" cy="0"/>
+          <a:chOff x="0" y="0"/>
+          <a:chExt cx="0" cy="0"/>
+        </a:xfrm>
+      </p:grpSpPr>
+      <p:sp>
+        <p:nvSpPr>
+          <p:cNvPr id="2" name="Titel 1"/>
+          <p:cNvSpPr>
+            <a:spLocks noGrp="1"/>
+          </p:cNvSpPr>
+          <p:nvPr>
+            <p:ph type="title"/>
+          </p:nvPr>
+        </p:nvSpPr>
+        <p:spPr/>
+        <p:txBody>
+          <a:bodyPr/>
+          <a:lstStyle/>
+          <a:p>
+            <a:r>
+              <a:rPr lang="de-DE" dirty="0" smtClean="0">
+                <a:solidFill>
+                  <a:schemeClr val="bg1"/>
+                </a:solidFill>
+              </a:rPr>
+              <a:t>Docker </a:t>
+            </a:r>
+            <a:r>
+              <a:rPr lang="de-DE" dirty="0" err="1" smtClean="0">
+                <a:solidFill>
+                  <a:schemeClr val="bg1"/>
+                </a:solidFill>
+              </a:rPr>
+              <a:t>for</a:t>
+            </a:r>
+            <a:r>
+              <a:rPr lang="de-DE" dirty="0" smtClean="0">
+                <a:solidFill>
+                  <a:schemeClr val="bg1"/>
+                </a:solidFill>
+              </a:rPr>
+              <a:t> Windows 🐳</a:t>
+            </a:r>
+            <a:endParaRPr lang="de-DE" dirty="0">
+              <a:solidFill>
+                <a:schemeClr val="bg1"/>
+              </a:solidFill>
+            </a:endParaRPr>
+          </a:p>
+        </p:txBody>
+      </p:sp>
+      <p:sp>
+        <p:nvSpPr>
+          <p:cNvPr id="3" name="Inhaltsplatzhalter 2"/>
+          <p:cNvSpPr>
+            <a:spLocks noGrp="1"/>
+          </p:cNvSpPr>
+          <p:nvPr>
+            <p:ph idx="1"/>
+          </p:nvPr>
+        </p:nvSpPr>
+        <p:spPr>
+          <a:xfrm>
+            <a:off x="838200" y="1825624"/>
+            <a:ext cx="10515600" cy="4762745"/>
+          </a:xfrm>
+        </p:spPr>
+        <p:txBody>
+          <a:bodyPr>
+            <a:normAutofit fontScale="92500" lnSpcReduction="10000"/>
+          </a:bodyPr>
+          <a:lstStyle/>
+          <a:p>
+            <a:pPr marL="0" indent="0">
+              <a:buNone/>
+            </a:pPr>
+            <a:endParaRPr lang="de-DE" dirty="0" smtClean="0">
+              <a:solidFill>
+                <a:schemeClr val="bg1"/>
+              </a:solidFill>
+            </a:endParaRPr>
+          </a:p>
+          <a:p>
+            <a:endParaRPr lang="de-DE" dirty="0">
+              <a:solidFill>
+                <a:schemeClr val="bg1"/>
+              </a:solidFill>
+            </a:endParaRPr>
+          </a:p>
+          <a:p>
+            <a:endParaRPr lang="de-DE" dirty="0" smtClean="0">
+              <a:solidFill>
+                <a:schemeClr val="bg1"/>
+              </a:solidFill>
+            </a:endParaRPr>
+          </a:p>
+          <a:p>
+            <a:endParaRPr lang="de-DE" dirty="0" smtClean="0">
+              <a:solidFill>
+                <a:schemeClr val="bg1"/>
+              </a:solidFill>
+            </a:endParaRPr>
+          </a:p>
+          <a:p>
+            <a:endParaRPr lang="de-DE" dirty="0">
+              <a:solidFill>
+                <a:schemeClr val="bg1"/>
+              </a:solidFill>
+            </a:endParaRPr>
+          </a:p>
+          <a:p>
+            <a:endParaRPr lang="de-DE" dirty="0" smtClean="0">
+              <a:solidFill>
+                <a:schemeClr val="bg1"/>
+              </a:solidFill>
+            </a:endParaRPr>
+          </a:p>
+          <a:p>
+            <a:endParaRPr lang="de-DE" dirty="0" smtClean="0">
+              <a:solidFill>
+                <a:schemeClr val="bg1"/>
+              </a:solidFill>
+            </a:endParaRPr>
+          </a:p>
+          <a:p>
+            <a:r>
+              <a:rPr lang="de-DE" sz="3000" dirty="0" smtClean="0">
+                <a:solidFill>
+                  <a:schemeClr val="bg1"/>
+                </a:solidFill>
+              </a:rPr>
+              <a:t>Nach der Installation mit der DOCKER ID anmelden</a:t>
+            </a:r>
+          </a:p>
+          <a:p>
+            <a:r>
+              <a:rPr lang="de-DE" sz="3000" dirty="0" smtClean="0">
+                <a:solidFill>
+                  <a:schemeClr val="bg1"/>
+                </a:solidFill>
+              </a:rPr>
+              <a:t>Läuft im Hintergrund als 🐋 Tray Icon</a:t>
+            </a:r>
+          </a:p>
+          <a:p>
+            <a:r>
+              <a:rPr lang="de-DE" sz="3000" dirty="0" smtClean="0">
+                <a:solidFill>
+                  <a:schemeClr val="bg1"/>
+                </a:solidFill>
+              </a:rPr>
+              <a:t>Auf ‚Windows Container‘ wechseln</a:t>
+            </a:r>
+          </a:p>
+        </p:txBody>
+      </p:sp>
+      <p:pic>
+        <p:nvPicPr>
+          <p:cNvPr id="5" name="Grafik 4"/>
+          <p:cNvPicPr>
+            <a:picLocks noChangeAspect="1"/>
+          </p:cNvPicPr>
+          <p:nvPr/>
+        </p:nvPicPr>
+        <p:blipFill>
+          <a:blip r:embed="rId2">
+            <a:extLst>
+              <a:ext uri="{28A0092B-C50C-407E-A947-70E740481C1C}">
+                <a14:useLocalDpi xmlns:a14="http://schemas.microsoft.com/office/drawing/2010/main" val="0"/>
+              </a:ext>
+            </a:extLst>
+          </a:blip>
+          <a:stretch>
+            <a:fillRect/>
+          </a:stretch>
+        </p:blipFill>
+        <p:spPr>
+          <a:xfrm>
+            <a:off x="1066800" y="1825625"/>
+            <a:ext cx="10058400" cy="2788603"/>
+          </a:xfrm>
+          <a:prstGeom prst="rect">
+            <a:avLst/>
+          </a:prstGeom>
+        </p:spPr>
+      </p:pic>
+    </p:spTree>
+    <p:extLst>
+      <p:ext uri="{BB962C8B-B14F-4D97-AF65-F5344CB8AC3E}">
+        <p14:creationId xmlns:p14="http://schemas.microsoft.com/office/powerpoint/2010/main" val="241650146"/>
+      </p:ext>
+    </p:extLst>
+  </p:cSld>
+  <p:clrMapOvr>
+    <a:masterClrMapping/>
+  </p:clrMapOvr>
+  <p:timing>
+    <p:tnLst>
+      <p:par>
+        <p:cTn id="1" dur="indefinite" restart="never" nodeType="tmRoot"/>
+      </p:par>
+    </p:tnLst>
+  </p:timing>
+</p:sld>
+</file>
+
+<file path=ppt/slides/slide6.xml><?xml version="1.0" encoding="utf-8"?>
+<p:sld xmlns:a="http://schemas.openxmlformats.org/drawingml/2006/main" xmlns:r="http://schemas.openxmlformats.org/officeDocument/2006/relationships" xmlns:p="http://schemas.openxmlformats.org/presentationml/2006/main">
+  <p:cSld>
+    <p:bg>
+      <p:bgPr>
+        <a:solidFill>
+          <a:schemeClr val="tx1">
+            <a:lumMod val="75000"/>
+            <a:lumOff val="25000"/>
+          </a:schemeClr>
+        </a:solidFill>
+        <a:effectLst/>
+      </p:bgPr>
+    </p:bg>
+    <p:spTree>
+      <p:nvGrpSpPr>
+        <p:cNvPr id="1" name=""/>
+        <p:cNvGrpSpPr/>
+        <p:nvPr/>
+      </p:nvGrpSpPr>
+      <p:grpSpPr>
+        <a:xfrm>
+          <a:off x="0" y="0"/>
+          <a:ext cx="0" cy="0"/>
+          <a:chOff x="0" y="0"/>
+          <a:chExt cx="0" cy="0"/>
+        </a:xfrm>
+      </p:grpSpPr>
+      <p:sp>
+        <p:nvSpPr>
+          <p:cNvPr id="2" name="Titel 1"/>
+          <p:cNvSpPr>
+            <a:spLocks noGrp="1"/>
+          </p:cNvSpPr>
+          <p:nvPr>
+            <p:ph type="title"/>
+          </p:nvPr>
+        </p:nvSpPr>
+        <p:spPr/>
+        <p:txBody>
+          <a:bodyPr/>
+          <a:lstStyle/>
+          <a:p>
+            <a:r>
+              <a:rPr lang="de-DE" dirty="0" smtClean="0">
+                <a:solidFill>
+                  <a:schemeClr val="bg1"/>
+                </a:solidFill>
+              </a:rPr>
               <a:t>Visual Studio Code</a:t>
             </a:r>
             <a:endParaRPr lang="de-DE" dirty="0">
@@ -4333,7 +6473,7 @@
 </p:sld>
 </file>
 
-<file path=ppt/slides/slide4.xml><?xml version="1.0" encoding="utf-8"?>
+<file path=ppt/slides/slide7.xml><?xml version="1.0" encoding="utf-8"?>
 <p:sld xmlns:a="http://schemas.openxmlformats.org/drawingml/2006/main" xmlns:r="http://schemas.openxmlformats.org/officeDocument/2006/relationships" xmlns:p="http://schemas.openxmlformats.org/presentationml/2006/main">
   <p:cSld>
     <p:bg>
@@ -4382,7 +6522,15 @@
                   <a:schemeClr val="bg1"/>
                 </a:solidFill>
               </a:rPr>
-              <a:t>Node.js 10.6 </a:t>
+              <a:t>Node.js </a:t>
+            </a:r>
+            <a:r>
+              <a:rPr lang="de-DE" dirty="0" smtClean="0">
+                <a:solidFill>
+                  <a:schemeClr val="bg1"/>
+                </a:solidFill>
+              </a:rPr>
+              <a:t>10.6.0 </a:t>
             </a:r>
             <a:r>
               <a:rPr lang="de-DE" dirty="0" err="1" smtClean="0">
@@ -4535,631 +6683,6 @@
 </p:sld>
 </file>
 
-<file path=ppt/slides/slide5.xml><?xml version="1.0" encoding="utf-8"?>
-<p:sld xmlns:a="http://schemas.openxmlformats.org/drawingml/2006/main" xmlns:r="http://schemas.openxmlformats.org/officeDocument/2006/relationships" xmlns:p="http://schemas.openxmlformats.org/presentationml/2006/main">
-  <p:cSld>
-    <p:bg>
-      <p:bgPr>
-        <a:solidFill>
-          <a:schemeClr val="tx1">
-            <a:lumMod val="75000"/>
-            <a:lumOff val="25000"/>
-          </a:schemeClr>
-        </a:solidFill>
-        <a:effectLst/>
-      </p:bgPr>
-    </p:bg>
-    <p:spTree>
-      <p:nvGrpSpPr>
-        <p:cNvPr id="1" name=""/>
-        <p:cNvGrpSpPr/>
-        <p:nvPr/>
-      </p:nvGrpSpPr>
-      <p:grpSpPr>
-        <a:xfrm>
-          <a:off x="0" y="0"/>
-          <a:ext cx="0" cy="0"/>
-          <a:chOff x="0" y="0"/>
-          <a:chExt cx="0" cy="0"/>
-        </a:xfrm>
-      </p:grpSpPr>
-      <p:sp>
-        <p:nvSpPr>
-          <p:cNvPr id="2" name="Titel 1"/>
-          <p:cNvSpPr>
-            <a:spLocks noGrp="1"/>
-          </p:cNvSpPr>
-          <p:nvPr>
-            <p:ph type="title"/>
-          </p:nvPr>
-        </p:nvSpPr>
-        <p:spPr/>
-        <p:txBody>
-          <a:bodyPr/>
-          <a:lstStyle/>
-          <a:p>
-            <a:r>
-              <a:rPr lang="de-DE" dirty="0" smtClean="0">
-                <a:solidFill>
-                  <a:schemeClr val="bg1"/>
-                </a:solidFill>
-              </a:rPr>
-              <a:t>.NET Core 2.1 &amp; .NET Framework 4.7.2</a:t>
-            </a:r>
-            <a:endParaRPr lang="de-DE" dirty="0">
-              <a:solidFill>
-                <a:schemeClr val="bg1"/>
-              </a:solidFill>
-            </a:endParaRPr>
-          </a:p>
-        </p:txBody>
-      </p:sp>
-      <p:sp>
-        <p:nvSpPr>
-          <p:cNvPr id="3" name="Inhaltsplatzhalter 2"/>
-          <p:cNvSpPr>
-            <a:spLocks noGrp="1"/>
-          </p:cNvSpPr>
-          <p:nvPr>
-            <p:ph idx="1"/>
-          </p:nvPr>
-        </p:nvSpPr>
-        <p:spPr/>
-        <p:txBody>
-          <a:bodyPr/>
-          <a:lstStyle/>
-          <a:p>
-            <a:pPr marL="0" indent="0">
-              <a:buNone/>
-            </a:pPr>
-            <a:endParaRPr lang="de-DE" dirty="0" smtClean="0">
-              <a:solidFill>
-                <a:schemeClr val="bg1"/>
-              </a:solidFill>
-            </a:endParaRPr>
-          </a:p>
-          <a:p>
-            <a:endParaRPr lang="de-DE" dirty="0">
-              <a:solidFill>
-                <a:schemeClr val="bg1"/>
-              </a:solidFill>
-            </a:endParaRPr>
-          </a:p>
-          <a:p>
-            <a:endParaRPr lang="de-DE" dirty="0" smtClean="0">
-              <a:solidFill>
-                <a:schemeClr val="bg1"/>
-              </a:solidFill>
-            </a:endParaRPr>
-          </a:p>
-          <a:p>
-            <a:endParaRPr lang="de-DE" dirty="0" smtClean="0">
-              <a:solidFill>
-                <a:schemeClr val="bg1"/>
-              </a:solidFill>
-            </a:endParaRPr>
-          </a:p>
-          <a:p>
-            <a:endParaRPr lang="de-DE" dirty="0">
-              <a:solidFill>
-                <a:schemeClr val="bg1"/>
-              </a:solidFill>
-            </a:endParaRPr>
-          </a:p>
-          <a:p>
-            <a:endParaRPr lang="de-DE" dirty="0" smtClean="0">
-              <a:solidFill>
-                <a:schemeClr val="bg1"/>
-              </a:solidFill>
-            </a:endParaRPr>
-          </a:p>
-          <a:p>
-            <a:endParaRPr lang="de-DE" dirty="0" smtClean="0">
-              <a:solidFill>
-                <a:schemeClr val="bg1"/>
-              </a:solidFill>
-            </a:endParaRPr>
-          </a:p>
-          <a:p>
-            <a:r>
-              <a:rPr lang="de-DE" dirty="0" smtClean="0">
-                <a:solidFill>
-                  <a:schemeClr val="bg1"/>
-                </a:solidFill>
-              </a:rPr>
-              <a:t>https://www.microsoft.com/net/download/windows</a:t>
-            </a:r>
-          </a:p>
-        </p:txBody>
-      </p:sp>
-      <p:pic>
-        <p:nvPicPr>
-          <p:cNvPr id="5" name="Grafik 4"/>
-          <p:cNvPicPr>
-            <a:picLocks noChangeAspect="1"/>
-          </p:cNvPicPr>
-          <p:nvPr/>
-        </p:nvPicPr>
-        <p:blipFill>
-          <a:blip r:embed="rId2">
-            <a:extLst>
-              <a:ext uri="{28A0092B-C50C-407E-A947-70E740481C1C}">
-                <a14:useLocalDpi xmlns:a14="http://schemas.microsoft.com/office/drawing/2010/main" val="0"/>
-              </a:ext>
-            </a:extLst>
-          </a:blip>
-          <a:stretch>
-            <a:fillRect/>
-          </a:stretch>
-        </p:blipFill>
-        <p:spPr>
-          <a:xfrm>
-            <a:off x="1066800" y="1825625"/>
-            <a:ext cx="10058400" cy="3281119"/>
-          </a:xfrm>
-          <a:prstGeom prst="rect">
-            <a:avLst/>
-          </a:prstGeom>
-        </p:spPr>
-      </p:pic>
-    </p:spTree>
-    <p:extLst>
-      <p:ext uri="{BB962C8B-B14F-4D97-AF65-F5344CB8AC3E}">
-        <p14:creationId xmlns:p14="http://schemas.microsoft.com/office/powerpoint/2010/main" val="2276303486"/>
-      </p:ext>
-    </p:extLst>
-  </p:cSld>
-  <p:clrMapOvr>
-    <a:masterClrMapping/>
-  </p:clrMapOvr>
-  <p:timing>
-    <p:tnLst>
-      <p:par>
-        <p:cTn id="1" dur="indefinite" restart="never" nodeType="tmRoot"/>
-      </p:par>
-    </p:tnLst>
-  </p:timing>
-</p:sld>
-</file>
-
-<file path=ppt/slides/slide6.xml><?xml version="1.0" encoding="utf-8"?>
-<p:sld xmlns:a="http://schemas.openxmlformats.org/drawingml/2006/main" xmlns:r="http://schemas.openxmlformats.org/officeDocument/2006/relationships" xmlns:p="http://schemas.openxmlformats.org/presentationml/2006/main">
-  <p:cSld>
-    <p:bg>
-      <p:bgPr>
-        <a:solidFill>
-          <a:schemeClr val="tx1">
-            <a:lumMod val="75000"/>
-            <a:lumOff val="25000"/>
-          </a:schemeClr>
-        </a:solidFill>
-        <a:effectLst/>
-      </p:bgPr>
-    </p:bg>
-    <p:spTree>
-      <p:nvGrpSpPr>
-        <p:cNvPr id="1" name=""/>
-        <p:cNvGrpSpPr/>
-        <p:nvPr/>
-      </p:nvGrpSpPr>
-      <p:grpSpPr>
-        <a:xfrm>
-          <a:off x="0" y="0"/>
-          <a:ext cx="0" cy="0"/>
-          <a:chOff x="0" y="0"/>
-          <a:chExt cx="0" cy="0"/>
-        </a:xfrm>
-      </p:grpSpPr>
-      <p:sp>
-        <p:nvSpPr>
-          <p:cNvPr id="2" name="Titel 1"/>
-          <p:cNvSpPr>
-            <a:spLocks noGrp="1"/>
-          </p:cNvSpPr>
-          <p:nvPr>
-            <p:ph type="title"/>
-          </p:nvPr>
-        </p:nvSpPr>
-        <p:spPr/>
-        <p:txBody>
-          <a:bodyPr/>
-          <a:lstStyle/>
-          <a:p>
-            <a:r>
-              <a:rPr lang="de-DE" dirty="0" smtClean="0">
-                <a:solidFill>
-                  <a:schemeClr val="bg1"/>
-                </a:solidFill>
-              </a:rPr>
-              <a:t>Docker </a:t>
-            </a:r>
-            <a:r>
-              <a:rPr lang="de-DE" dirty="0" err="1" smtClean="0">
-                <a:solidFill>
-                  <a:schemeClr val="bg1"/>
-                </a:solidFill>
-              </a:rPr>
-              <a:t>for</a:t>
-            </a:r>
-            <a:r>
-              <a:rPr lang="de-DE" dirty="0" smtClean="0">
-                <a:solidFill>
-                  <a:schemeClr val="bg1"/>
-                </a:solidFill>
-              </a:rPr>
-              <a:t> Windows 🐳</a:t>
-            </a:r>
-            <a:endParaRPr lang="de-DE" dirty="0">
-              <a:solidFill>
-                <a:schemeClr val="bg1"/>
-              </a:solidFill>
-            </a:endParaRPr>
-          </a:p>
-        </p:txBody>
-      </p:sp>
-      <p:sp>
-        <p:nvSpPr>
-          <p:cNvPr id="3" name="Inhaltsplatzhalter 2"/>
-          <p:cNvSpPr>
-            <a:spLocks noGrp="1"/>
-          </p:cNvSpPr>
-          <p:nvPr>
-            <p:ph idx="1"/>
-          </p:nvPr>
-        </p:nvSpPr>
-        <p:spPr/>
-        <p:txBody>
-          <a:bodyPr>
-            <a:normAutofit/>
-          </a:bodyPr>
-          <a:lstStyle/>
-          <a:p>
-            <a:pPr marL="0" indent="0">
-              <a:buNone/>
-            </a:pPr>
-            <a:endParaRPr lang="de-DE" dirty="0" smtClean="0">
-              <a:solidFill>
-                <a:schemeClr val="bg1"/>
-              </a:solidFill>
-            </a:endParaRPr>
-          </a:p>
-          <a:p>
-            <a:endParaRPr lang="de-DE" dirty="0">
-              <a:solidFill>
-                <a:schemeClr val="bg1"/>
-              </a:solidFill>
-            </a:endParaRPr>
-          </a:p>
-          <a:p>
-            <a:endParaRPr lang="de-DE" dirty="0" smtClean="0">
-              <a:solidFill>
-                <a:schemeClr val="bg1"/>
-              </a:solidFill>
-            </a:endParaRPr>
-          </a:p>
-          <a:p>
-            <a:endParaRPr lang="de-DE" dirty="0" smtClean="0">
-              <a:solidFill>
-                <a:schemeClr val="bg1"/>
-              </a:solidFill>
-            </a:endParaRPr>
-          </a:p>
-          <a:p>
-            <a:endParaRPr lang="de-DE" dirty="0">
-              <a:solidFill>
-                <a:schemeClr val="bg1"/>
-              </a:solidFill>
-            </a:endParaRPr>
-          </a:p>
-          <a:p>
-            <a:endParaRPr lang="de-DE" dirty="0" smtClean="0">
-              <a:solidFill>
-                <a:schemeClr val="bg1"/>
-              </a:solidFill>
-            </a:endParaRPr>
-          </a:p>
-          <a:p>
-            <a:r>
-              <a:rPr lang="de-DE" dirty="0" smtClean="0">
-                <a:solidFill>
-                  <a:schemeClr val="bg1"/>
-                </a:solidFill>
-              </a:rPr>
-              <a:t>Anmelden und DOCKER ID mit Passwort erzeugen</a:t>
-            </a:r>
-          </a:p>
-          <a:p>
-            <a:r>
-              <a:rPr lang="de-DE" dirty="0" smtClean="0">
-                <a:solidFill>
-                  <a:schemeClr val="bg1"/>
-                </a:solidFill>
-              </a:rPr>
-              <a:t>https://www.docker.com/docker-windows</a:t>
-            </a:r>
-          </a:p>
-        </p:txBody>
-      </p:sp>
-      <p:pic>
-        <p:nvPicPr>
-          <p:cNvPr id="4" name="Grafik 3"/>
-          <p:cNvPicPr>
-            <a:picLocks noChangeAspect="1"/>
-          </p:cNvPicPr>
-          <p:nvPr/>
-        </p:nvPicPr>
-        <p:blipFill>
-          <a:blip r:embed="rId2">
-            <a:extLst>
-              <a:ext uri="{28A0092B-C50C-407E-A947-70E740481C1C}">
-                <a14:useLocalDpi xmlns:a14="http://schemas.microsoft.com/office/drawing/2010/main" val="0"/>
-              </a:ext>
-            </a:extLst>
-          </a:blip>
-          <a:stretch>
-            <a:fillRect/>
-          </a:stretch>
-        </p:blipFill>
-        <p:spPr>
-          <a:xfrm>
-            <a:off x="1066800" y="1825625"/>
-            <a:ext cx="10058400" cy="2511131"/>
-          </a:xfrm>
-          <a:prstGeom prst="rect">
-            <a:avLst/>
-          </a:prstGeom>
-        </p:spPr>
-      </p:pic>
-    </p:spTree>
-    <p:extLst>
-      <p:ext uri="{BB962C8B-B14F-4D97-AF65-F5344CB8AC3E}">
-        <p14:creationId xmlns:p14="http://schemas.microsoft.com/office/powerpoint/2010/main" val="1518563153"/>
-      </p:ext>
-    </p:extLst>
-  </p:cSld>
-  <p:clrMapOvr>
-    <a:masterClrMapping/>
-  </p:clrMapOvr>
-  <p:timing>
-    <p:tnLst>
-      <p:par>
-        <p:cTn id="1" dur="indefinite" restart="never" nodeType="tmRoot"/>
-      </p:par>
-    </p:tnLst>
-  </p:timing>
-</p:sld>
-</file>
-
-<file path=ppt/slides/slide7.xml><?xml version="1.0" encoding="utf-8"?>
-<p:sld xmlns:a="http://schemas.openxmlformats.org/drawingml/2006/main" xmlns:r="http://schemas.openxmlformats.org/officeDocument/2006/relationships" xmlns:p="http://schemas.openxmlformats.org/presentationml/2006/main">
-  <p:cSld>
-    <p:bg>
-      <p:bgPr>
-        <a:solidFill>
-          <a:schemeClr val="tx1">
-            <a:lumMod val="75000"/>
-            <a:lumOff val="25000"/>
-          </a:schemeClr>
-        </a:solidFill>
-        <a:effectLst/>
-      </p:bgPr>
-    </p:bg>
-    <p:spTree>
-      <p:nvGrpSpPr>
-        <p:cNvPr id="1" name=""/>
-        <p:cNvGrpSpPr/>
-        <p:nvPr/>
-      </p:nvGrpSpPr>
-      <p:grpSpPr>
-        <a:xfrm>
-          <a:off x="0" y="0"/>
-          <a:ext cx="0" cy="0"/>
-          <a:chOff x="0" y="0"/>
-          <a:chExt cx="0" cy="0"/>
-        </a:xfrm>
-      </p:grpSpPr>
-      <p:sp>
-        <p:nvSpPr>
-          <p:cNvPr id="2" name="Titel 1"/>
-          <p:cNvSpPr>
-            <a:spLocks noGrp="1"/>
-          </p:cNvSpPr>
-          <p:nvPr>
-            <p:ph type="title"/>
-          </p:nvPr>
-        </p:nvSpPr>
-        <p:spPr/>
-        <p:txBody>
-          <a:bodyPr/>
-          <a:lstStyle/>
-          <a:p>
-            <a:r>
-              <a:rPr lang="de-DE" dirty="0" smtClean="0">
-                <a:solidFill>
-                  <a:schemeClr val="bg1"/>
-                </a:solidFill>
-              </a:rPr>
-              <a:t>Docker </a:t>
-            </a:r>
-            <a:r>
-              <a:rPr lang="de-DE" dirty="0" err="1" smtClean="0">
-                <a:solidFill>
-                  <a:schemeClr val="bg1"/>
-                </a:solidFill>
-              </a:rPr>
-              <a:t>for</a:t>
-            </a:r>
-            <a:r>
-              <a:rPr lang="de-DE" dirty="0" smtClean="0">
-                <a:solidFill>
-                  <a:schemeClr val="bg1"/>
-                </a:solidFill>
-              </a:rPr>
-              <a:t> Windows 🐳</a:t>
-            </a:r>
-            <a:endParaRPr lang="de-DE" dirty="0">
-              <a:solidFill>
-                <a:schemeClr val="bg1"/>
-              </a:solidFill>
-            </a:endParaRPr>
-          </a:p>
-        </p:txBody>
-      </p:sp>
-      <p:sp>
-        <p:nvSpPr>
-          <p:cNvPr id="3" name="Inhaltsplatzhalter 2"/>
-          <p:cNvSpPr>
-            <a:spLocks noGrp="1"/>
-          </p:cNvSpPr>
-          <p:nvPr>
-            <p:ph idx="1"/>
-          </p:nvPr>
-        </p:nvSpPr>
-        <p:spPr>
-          <a:xfrm>
-            <a:off x="838200" y="1825624"/>
-            <a:ext cx="10515600" cy="4762745"/>
-          </a:xfrm>
-        </p:spPr>
-        <p:txBody>
-          <a:bodyPr>
-            <a:normAutofit fontScale="92500" lnSpcReduction="10000"/>
-          </a:bodyPr>
-          <a:lstStyle/>
-          <a:p>
-            <a:pPr marL="0" indent="0">
-              <a:buNone/>
-            </a:pPr>
-            <a:endParaRPr lang="de-DE" dirty="0" smtClean="0">
-              <a:solidFill>
-                <a:schemeClr val="bg1"/>
-              </a:solidFill>
-            </a:endParaRPr>
-          </a:p>
-          <a:p>
-            <a:endParaRPr lang="de-DE" dirty="0">
-              <a:solidFill>
-                <a:schemeClr val="bg1"/>
-              </a:solidFill>
-            </a:endParaRPr>
-          </a:p>
-          <a:p>
-            <a:endParaRPr lang="de-DE" dirty="0" smtClean="0">
-              <a:solidFill>
-                <a:schemeClr val="bg1"/>
-              </a:solidFill>
-            </a:endParaRPr>
-          </a:p>
-          <a:p>
-            <a:endParaRPr lang="de-DE" dirty="0" smtClean="0">
-              <a:solidFill>
-                <a:schemeClr val="bg1"/>
-              </a:solidFill>
-            </a:endParaRPr>
-          </a:p>
-          <a:p>
-            <a:endParaRPr lang="de-DE" dirty="0">
-              <a:solidFill>
-                <a:schemeClr val="bg1"/>
-              </a:solidFill>
-            </a:endParaRPr>
-          </a:p>
-          <a:p>
-            <a:endParaRPr lang="de-DE" dirty="0" smtClean="0">
-              <a:solidFill>
-                <a:schemeClr val="bg1"/>
-              </a:solidFill>
-            </a:endParaRPr>
-          </a:p>
-          <a:p>
-            <a:endParaRPr lang="de-DE" dirty="0" smtClean="0">
-              <a:solidFill>
-                <a:schemeClr val="bg1"/>
-              </a:solidFill>
-            </a:endParaRPr>
-          </a:p>
-          <a:p>
-            <a:r>
-              <a:rPr lang="de-DE" sz="3000" dirty="0" smtClean="0">
-                <a:solidFill>
-                  <a:schemeClr val="bg1"/>
-                </a:solidFill>
-              </a:rPr>
-              <a:t>Nach der Installation mit der DOCKER ID anmelden</a:t>
-            </a:r>
-          </a:p>
-          <a:p>
-            <a:r>
-              <a:rPr lang="de-DE" sz="3000" dirty="0" smtClean="0">
-                <a:solidFill>
-                  <a:schemeClr val="bg1"/>
-                </a:solidFill>
-              </a:rPr>
-              <a:t>Läuft im Hintergrund als 🐋 Tray Icon</a:t>
-            </a:r>
-          </a:p>
-          <a:p>
-            <a:r>
-              <a:rPr lang="de-DE" sz="3000" dirty="0" smtClean="0">
-                <a:solidFill>
-                  <a:schemeClr val="bg1"/>
-                </a:solidFill>
-              </a:rPr>
-              <a:t>Auf ‚Windows Container‘ wechseln</a:t>
-            </a:r>
-          </a:p>
-        </p:txBody>
-      </p:sp>
-      <p:pic>
-        <p:nvPicPr>
-          <p:cNvPr id="5" name="Grafik 4"/>
-          <p:cNvPicPr>
-            <a:picLocks noChangeAspect="1"/>
-          </p:cNvPicPr>
-          <p:nvPr/>
-        </p:nvPicPr>
-        <p:blipFill>
-          <a:blip r:embed="rId2">
-            <a:extLst>
-              <a:ext uri="{28A0092B-C50C-407E-A947-70E740481C1C}">
-                <a14:useLocalDpi xmlns:a14="http://schemas.microsoft.com/office/drawing/2010/main" val="0"/>
-              </a:ext>
-            </a:extLst>
-          </a:blip>
-          <a:stretch>
-            <a:fillRect/>
-          </a:stretch>
-        </p:blipFill>
-        <p:spPr>
-          <a:xfrm>
-            <a:off x="1066800" y="1825625"/>
-            <a:ext cx="10058400" cy="2788603"/>
-          </a:xfrm>
-          <a:prstGeom prst="rect">
-            <a:avLst/>
-          </a:prstGeom>
-        </p:spPr>
-      </p:pic>
-    </p:spTree>
-    <p:extLst>
-      <p:ext uri="{BB962C8B-B14F-4D97-AF65-F5344CB8AC3E}">
-        <p14:creationId xmlns:p14="http://schemas.microsoft.com/office/powerpoint/2010/main" val="241650146"/>
-      </p:ext>
-    </p:extLst>
-  </p:cSld>
-  <p:clrMapOvr>
-    <a:masterClrMapping/>
-  </p:clrMapOvr>
-  <p:timing>
-    <p:tnLst>
-      <p:par>
-        <p:cTn id="1" dur="indefinite" restart="never" nodeType="tmRoot"/>
-      </p:par>
-    </p:tnLst>
-  </p:timing>
-</p:sld>
-</file>
-
 <file path=ppt/slides/slide8.xml><?xml version="1.0" encoding="utf-8"?>
 <p:sld xmlns:a="http://schemas.openxmlformats.org/drawingml/2006/main" xmlns:r="http://schemas.openxmlformats.org/officeDocument/2006/relationships" xmlns:p="http://schemas.openxmlformats.org/presentationml/2006/main">
   <p:cSld>
@@ -5204,28 +6727,36 @@
           <a:lstStyle/>
           <a:p>
             <a:r>
-              <a:rPr lang="de-DE" dirty="0" smtClean="0">
-                <a:solidFill>
-                  <a:schemeClr val="bg1"/>
-                </a:solidFill>
-              </a:rPr>
-              <a:t>Landau Media </a:t>
-            </a:r>
-            <a:r>
               <a:rPr lang="de-DE" dirty="0" err="1" smtClean="0">
                 <a:solidFill>
                   <a:schemeClr val="bg1"/>
                 </a:solidFill>
               </a:rPr>
-              <a:t>Azure</a:t>
-            </a:r>
-            <a:r>
-              <a:rPr lang="de-DE" dirty="0" smtClean="0">
-                <a:solidFill>
-                  <a:schemeClr val="bg1"/>
-                </a:solidFill>
-              </a:rPr>
-              <a:t> Portal</a:t>
+              <a:t>Elastic</a:t>
+            </a:r>
+            <a:r>
+              <a:rPr lang="de-DE" dirty="0" smtClean="0">
+                <a:solidFill>
+                  <a:schemeClr val="bg1"/>
+                </a:solidFill>
+              </a:rPr>
+              <a:t> Search &amp; </a:t>
+            </a:r>
+            <a:r>
+              <a:rPr lang="de-DE" dirty="0" err="1" smtClean="0">
+                <a:solidFill>
+                  <a:schemeClr val="bg1"/>
+                </a:solidFill>
+              </a:rPr>
+              <a:t>Kibana</a:t>
+            </a:r>
+            <a:r>
+              <a:rPr lang="de-DE" dirty="0" smtClean="0">
+                <a:solidFill>
+                  <a:schemeClr val="bg1"/>
+                </a:solidFill>
+              </a:rPr>
+              <a:t> (optional)</a:t>
             </a:r>
             <a:endParaRPr lang="de-DE" dirty="0">
               <a:solidFill>
@@ -5245,10 +6776,15 @@
             <p:ph idx="1"/>
           </p:nvPr>
         </p:nvSpPr>
-        <p:spPr/>
+        <p:spPr>
+          <a:xfrm>
+            <a:off x="838200" y="1825624"/>
+            <a:ext cx="10515600" cy="5032376"/>
+          </a:xfrm>
+        </p:spPr>
         <p:txBody>
           <a:bodyPr>
-            <a:normAutofit/>
+            <a:normAutofit fontScale="92500" lnSpcReduction="10000"/>
           </a:bodyPr>
           <a:lstStyle/>
           <a:p>
@@ -5297,47 +6833,148 @@
             </a:endParaRPr>
           </a:p>
           <a:p>
-            <a:r>
-              <a:rPr lang="de-DE" dirty="0" smtClean="0">
-                <a:solidFill>
-                  <a:schemeClr val="bg1"/>
-                </a:solidFill>
-              </a:rPr>
-              <a:t>https://portal.azure.com/</a:t>
-            </a:r>
-          </a:p>
-          <a:p>
-            <a:r>
-              <a:rPr lang="de-DE" dirty="0" err="1">
-                <a:solidFill>
-                  <a:schemeClr val="bg1"/>
-                </a:solidFill>
-              </a:rPr>
-              <a:t>v</a:t>
-            </a:r>
-            <a:r>
-              <a:rPr lang="de-DE" dirty="0" err="1" smtClean="0">
-                <a:solidFill>
-                  <a:schemeClr val="bg1"/>
-                </a:solidFill>
-              </a:rPr>
-              <a:t>orsicht</a:t>
-            </a:r>
-            <a:r>
-              <a:rPr lang="de-DE" dirty="0" smtClean="0">
-                <a:solidFill>
-                  <a:schemeClr val="bg1"/>
-                </a:solidFill>
-              </a:rPr>
-              <a:t>: Landau Media Zugang</a:t>
-            </a:r>
-          </a:p>
-        </p:txBody>
-      </p:sp>
+            <a:endParaRPr lang="de-DE" dirty="0" smtClean="0">
+              <a:solidFill>
+                <a:schemeClr val="bg1"/>
+              </a:solidFill>
+            </a:endParaRPr>
+          </a:p>
+          <a:p>
+            <a:endParaRPr lang="de-DE" dirty="0" smtClean="0">
+              <a:solidFill>
+                <a:schemeClr val="bg1"/>
+              </a:solidFill>
+            </a:endParaRPr>
+          </a:p>
+          <a:p>
+            <a:r>
+              <a:rPr lang="de-DE" sz="3000" dirty="0" smtClean="0">
+                <a:solidFill>
+                  <a:schemeClr val="bg1"/>
+                </a:solidFill>
+              </a:rPr>
+              <a:t>https://</a:t>
+            </a:r>
+            <a:r>
+              <a:rPr lang="de-DE" sz="3000" dirty="0" smtClean="0">
+                <a:solidFill>
+                  <a:schemeClr val="bg1"/>
+                </a:solidFill>
+              </a:rPr>
+              <a:t>www.elastic.co/start	</a:t>
+            </a:r>
+            <a:endParaRPr lang="de-DE" sz="3000" dirty="0" smtClean="0">
+              <a:solidFill>
+                <a:schemeClr val="bg1"/>
+              </a:solidFill>
+            </a:endParaRPr>
+          </a:p>
+          <a:p>
+            <a:r>
+              <a:rPr lang="de-DE" sz="3000" dirty="0" smtClean="0">
+                <a:solidFill>
+                  <a:schemeClr val="bg1"/>
+                </a:solidFill>
+              </a:rPr>
+              <a:t>&gt; </a:t>
+            </a:r>
+            <a:r>
+              <a:rPr lang="de-DE" sz="3000" dirty="0" smtClean="0">
+                <a:solidFill>
+                  <a:schemeClr val="bg1"/>
+                </a:solidFill>
+              </a:rPr>
+              <a:t>bin\elasticsearch.bat		&gt; bin\kibana.bat</a:t>
+            </a:r>
+            <a:endParaRPr lang="de-DE" sz="3000" dirty="0" smtClean="0">
+              <a:solidFill>
+                <a:schemeClr val="bg1"/>
+              </a:solidFill>
+            </a:endParaRPr>
+          </a:p>
+          <a:p>
+            <a:r>
+              <a:rPr lang="de-DE" sz="3000" dirty="0" smtClean="0">
+                <a:solidFill>
+                  <a:schemeClr val="bg1"/>
+                </a:solidFill>
+              </a:rPr>
+              <a:t>http://localhost:9200</a:t>
+            </a:r>
+            <a:r>
+              <a:rPr lang="de-DE" sz="3000" dirty="0" smtClean="0">
+                <a:solidFill>
+                  <a:schemeClr val="bg1"/>
+                </a:solidFill>
+              </a:rPr>
+              <a:t>/	</a:t>
+            </a:r>
+            <a:r>
+              <a:rPr lang="de-DE" sz="3000" dirty="0">
+                <a:solidFill>
+                  <a:schemeClr val="bg1"/>
+                </a:solidFill>
+              </a:rPr>
+              <a:t>	</a:t>
+            </a:r>
+            <a:r>
+              <a:rPr lang="de-DE" sz="3000" dirty="0" smtClean="0">
+                <a:solidFill>
+                  <a:schemeClr val="bg1"/>
+                </a:solidFill>
+              </a:rPr>
+              <a:t>http</a:t>
+            </a:r>
+            <a:r>
+              <a:rPr lang="de-DE" sz="3000" dirty="0">
+                <a:solidFill>
+                  <a:schemeClr val="bg1"/>
+                </a:solidFill>
+              </a:rPr>
+              <a:t>://localhost:5601/</a:t>
+            </a:r>
+            <a:endParaRPr lang="de-DE" sz="3000" dirty="0" smtClean="0">
+              <a:solidFill>
+                <a:schemeClr val="bg1"/>
+              </a:solidFill>
+            </a:endParaRPr>
+          </a:p>
+        </p:txBody>
+      </p:sp>
+      <p:pic>
+        <p:nvPicPr>
+          <p:cNvPr id="5" name="Grafik 4"/>
+          <p:cNvPicPr>
+            <a:picLocks noChangeAspect="1"/>
+          </p:cNvPicPr>
+          <p:nvPr/>
+        </p:nvPicPr>
+        <p:blipFill>
+          <a:blip r:embed="rId2">
+            <a:extLst>
+              <a:ext uri="{28A0092B-C50C-407E-A947-70E740481C1C}">
+                <a14:useLocalDpi xmlns:a14="http://schemas.microsoft.com/office/drawing/2010/main" val="0"/>
+              </a:ext>
+            </a:extLst>
+          </a:blip>
+          <a:stretch>
+            <a:fillRect/>
+          </a:stretch>
+        </p:blipFill>
+        <p:spPr>
+          <a:xfrm>
+            <a:off x="1066800" y="1825624"/>
+            <a:ext cx="10058400" cy="3107698"/>
+          </a:xfrm>
+          <a:prstGeom prst="rect">
+            <a:avLst/>
+          </a:prstGeom>
+        </p:spPr>
+      </p:pic>
     </p:spTree>
     <p:extLst>
       <p:ext uri="{BB962C8B-B14F-4D97-AF65-F5344CB8AC3E}">
-        <p14:creationId xmlns:p14="http://schemas.microsoft.com/office/powerpoint/2010/main" val="2066830972"/>
+        <p14:creationId xmlns:p14="http://schemas.microsoft.com/office/powerpoint/2010/main" val="1689494907"/>
       </p:ext>
     </p:extLst>
   </p:cSld>
@@ -5403,23 +7040,7 @@
                   <a:schemeClr val="bg1"/>
                 </a:solidFill>
               </a:rPr>
-              <a:t>Persönliches </a:t>
-            </a:r>
-            <a:r>
-              <a:rPr lang="de-DE" dirty="0" err="1" smtClean="0">
-                <a:solidFill>
-                  <a:schemeClr val="bg1"/>
-                </a:solidFill>
-              </a:rPr>
-              <a:t>Azure</a:t>
-            </a:r>
-            <a:r>
-              <a:rPr lang="de-DE" dirty="0" smtClean="0">
-                <a:solidFill>
-                  <a:schemeClr val="bg1"/>
-                </a:solidFill>
-              </a:rPr>
-              <a:t> Portal (optional)</a:t>
+              <a:t>Installation prüfen</a:t>
             </a:r>
             <a:endParaRPr lang="de-DE" dirty="0">
               <a:solidFill>
@@ -5496,44 +7117,102 @@
             </a:endParaRPr>
           </a:p>
           <a:p>
-            <a:endParaRPr lang="de-DE" dirty="0" smtClean="0">
-              <a:solidFill>
-                <a:schemeClr val="bg1"/>
-              </a:solidFill>
-            </a:endParaRPr>
-          </a:p>
-          <a:p>
-            <a:r>
-              <a:rPr lang="de-DE" dirty="0" smtClean="0">
-                <a:solidFill>
-                  <a:schemeClr val="bg1"/>
-                </a:solidFill>
-              </a:rPr>
-              <a:t>Kostenlos und 170€ Startguthaben im ersten Monat</a:t>
-            </a:r>
-          </a:p>
-          <a:p>
-            <a:r>
-              <a:rPr lang="de-DE" dirty="0" smtClean="0">
-                <a:solidFill>
-                  <a:schemeClr val="bg1"/>
-                </a:solidFill>
-              </a:rPr>
-              <a:t>Microsoft Account und Kreditkarte erforderlich</a:t>
-            </a:r>
-          </a:p>
-          <a:p>
-            <a:endParaRPr lang="de-DE" dirty="0" smtClean="0">
-              <a:solidFill>
-                <a:schemeClr val="bg1"/>
-              </a:solidFill>
-            </a:endParaRPr>
+            <a:r>
+              <a:rPr lang="de-DE" dirty="0" smtClean="0">
+                <a:solidFill>
+                  <a:schemeClr val="bg1"/>
+                </a:solidFill>
+              </a:rPr>
+              <a:t>&gt; </a:t>
+            </a:r>
+            <a:r>
+              <a:rPr lang="de-DE" dirty="0" err="1" smtClean="0">
+                <a:solidFill>
+                  <a:schemeClr val="bg1"/>
+                </a:solidFill>
+              </a:rPr>
+              <a:t>java</a:t>
+            </a:r>
+            <a:r>
+              <a:rPr lang="de-DE" dirty="0" smtClean="0">
+                <a:solidFill>
+                  <a:schemeClr val="bg1"/>
+                </a:solidFill>
+              </a:rPr>
+              <a:t> –</a:t>
+            </a:r>
+            <a:r>
+              <a:rPr lang="de-DE" dirty="0" err="1" smtClean="0">
+                <a:solidFill>
+                  <a:schemeClr val="bg1"/>
+                </a:solidFill>
+              </a:rPr>
+              <a:t>version</a:t>
+            </a:r>
+            <a:r>
+              <a:rPr lang="de-DE" dirty="0">
+                <a:solidFill>
+                  <a:schemeClr val="bg1"/>
+                </a:solidFill>
+              </a:rPr>
+              <a:t> </a:t>
+            </a:r>
+            <a:r>
+              <a:rPr lang="de-DE" dirty="0" smtClean="0">
+                <a:solidFill>
+                  <a:schemeClr val="bg1"/>
+                </a:solidFill>
+              </a:rPr>
+              <a:t>-&gt; </a:t>
+            </a:r>
+            <a:r>
+              <a:rPr lang="de-DE" dirty="0" err="1" smtClean="0">
+                <a:solidFill>
+                  <a:schemeClr val="bg1"/>
+                </a:solidFill>
+              </a:rPr>
+              <a:t>java</a:t>
+            </a:r>
+            <a:r>
+              <a:rPr lang="de-DE" dirty="0" smtClean="0">
+                <a:solidFill>
+                  <a:schemeClr val="bg1"/>
+                </a:solidFill>
+              </a:rPr>
+              <a:t> </a:t>
+            </a:r>
+            <a:r>
+              <a:rPr lang="de-DE" dirty="0" err="1" smtClean="0">
+                <a:solidFill>
+                  <a:schemeClr val="bg1"/>
+                </a:solidFill>
+              </a:rPr>
+              <a:t>version</a:t>
+            </a:r>
+            <a:r>
+              <a:rPr lang="de-DE" dirty="0" smtClean="0">
+                <a:solidFill>
+                  <a:schemeClr val="bg1"/>
+                </a:solidFill>
+              </a:rPr>
+              <a:t> "10.0.1" 2018-04-17</a:t>
+            </a:r>
+          </a:p>
+          <a:p>
+            <a:r>
+              <a:rPr lang="de-DE" dirty="0" smtClean="0">
+                <a:solidFill>
+                  <a:schemeClr val="bg1"/>
+                </a:solidFill>
+              </a:rPr>
+              <a:t>&gt; echo %JAVA_HOME -&gt; C:\Program Files\Java\jdk-10.0.1</a:t>
+            </a:r>
           </a:p>
         </p:txBody>
       </p:sp>
       <p:pic>
         <p:nvPicPr>
-          <p:cNvPr id="4" name="Grafik 3"/>
+          <p:cNvPr id="6" name="Grafik 5"/>
           <p:cNvPicPr>
             <a:picLocks noChangeAspect="1"/>
           </p:cNvPicPr>
@@ -5553,8 +7232,8 @@
         </p:blipFill>
         <p:spPr>
           <a:xfrm>
-            <a:off x="1066800" y="1825624"/>
-            <a:ext cx="10058400" cy="2989772"/>
+            <a:off x="2004441" y="1825624"/>
+            <a:ext cx="8183117" cy="2753109"/>
           </a:xfrm>
           <a:prstGeom prst="rect">
             <a:avLst/>
@@ -5564,7 +7243,7 @@
     </p:spTree>
     <p:extLst>
       <p:ext uri="{BB962C8B-B14F-4D97-AF65-F5344CB8AC3E}">
-        <p14:creationId xmlns:p14="http://schemas.microsoft.com/office/powerpoint/2010/main" val="3202439275"/>
+        <p14:creationId xmlns:p14="http://schemas.microsoft.com/office/powerpoint/2010/main" val="1642100510"/>
       </p:ext>
     </p:extLst>
   </p:cSld>
@@ -5840,4 +7519,265 @@
     </a:ext>
   </a:extLst>
 </a:theme>
+</file>
+
+<file path=ppt/theme/theme2.xml><?xml version="1.0" encoding="utf-8"?>
+<a:theme xmlns:a="http://schemas.openxmlformats.org/drawingml/2006/main" name="Office Theme">
+  <a:themeElements>
+    <a:clrScheme name="Office">
+      <a:dk1>
+        <a:sysClr val="windowText" lastClr="000000"/>
+      </a:dk1>
+      <a:lt1>
+        <a:sysClr val="window" lastClr="FFFFFF"/>
+      </a:lt1>
+      <a:dk2>
+        <a:srgbClr val="44546A"/>
+      </a:dk2>
+      <a:lt2>
+        <a:srgbClr val="E7E6E6"/>
+      </a:lt2>
+      <a:accent1>
+        <a:srgbClr val="5B9BD5"/>
+      </a:accent1>
+      <a:accent2>
+        <a:srgbClr val="ED7D31"/>
+      </a:accent2>
+      <a:accent3>
+        <a:srgbClr val="A5A5A5"/>
+      </a:accent3>
+      <a:accent4>
+        <a:srgbClr val="FFC000"/>
+      </a:accent4>
+      <a:accent5>
+        <a:srgbClr val="4472C4"/>
+      </a:accent5>
+      <a:accent6>
+        <a:srgbClr val="70AD47"/>
+      </a:accent6>
+      <a:hlink>
+        <a:srgbClr val="0563C1"/>
+      </a:hlink>
+      <a:folHlink>
+        <a:srgbClr val="954F72"/>
+      </a:folHlink>
+    </a:clrScheme>
+    <a:fontScheme name="Office">
+      <a:majorFont>
+        <a:latin typeface="Calibri Light" panose="020F0302020204030204"/>
+        <a:ea typeface=""/>
+        <a:cs typeface=""/>
+        <a:font script="Jpan" typeface="ＭＳ Ｐゴシック"/>
+        <a:font script="Hang" typeface="맑은 고딕"/>
+        <a:font script="Hans" typeface="宋体"/>
+        <a:font script="Hant" typeface="新細明體"/>
+        <a:font script="Arab" typeface="Times New Roman"/>
+        <a:font script="Hebr" typeface="Times New Roman"/>
+        <a:font script="Thai" typeface="Angsana New"/>
+        <a:font script="Ethi" typeface="Nyala"/>
+        <a:font script="Beng" typeface="Vrinda"/>
+        <a:font script="Gujr" typeface="Shruti"/>
+        <a:font script="Khmr" typeface="MoolBoran"/>
+        <a:font script="Knda" typeface="Tunga"/>
+        <a:font script="Guru" typeface="Raavi"/>
+        <a:font script="Cans" typeface="Euphemia"/>
+        <a:font script="Cher" typeface="Plantagenet Cherokee"/>
+        <a:font script="Yiii" typeface="Microsoft Yi Baiti"/>
+        <a:font script="Tibt" typeface="Microsoft Himalaya"/>
+        <a:font script="Thaa" typeface="MV Boli"/>
+        <a:font script="Deva" typeface="Mangal"/>
+        <a:font script="Telu" typeface="Gautami"/>
+        <a:font script="Taml" typeface="Latha"/>
+        <a:font script="Syrc" typeface="Estrangelo Edessa"/>
+        <a:font script="Orya" typeface="Kalinga"/>
+        <a:font script="Mlym" typeface="Kartika"/>
+        <a:font script="Laoo" typeface="DokChampa"/>
+        <a:font script="Sinh" typeface="Iskoola Pota"/>
+        <a:font script="Mong" typeface="Mongolian Baiti"/>
+        <a:font script="Viet" typeface="Times New Roman"/>
+        <a:font script="Uigh" typeface="Microsoft Uighur"/>
+        <a:font script="Geor" typeface="Sylfaen"/>
+      </a:majorFont>
+      <a:minorFont>
+        <a:latin typeface="Calibri" panose="020F0502020204030204"/>
+        <a:ea typeface=""/>
+        <a:cs typeface=""/>
+        <a:font script="Jpan" typeface="ＭＳ Ｐゴシック"/>
+        <a:font script="Hang" typeface="맑은 고딕"/>
+        <a:font script="Hans" typeface="宋体"/>
+        <a:font script="Hant" typeface="新細明體"/>
+        <a:font script="Arab" typeface="Arial"/>
+        <a:font script="Hebr" typeface="Arial"/>
+        <a:font script="Thai" typeface="Cordia New"/>
+        <a:font script="Ethi" typeface="Nyala"/>
+        <a:font script="Beng" typeface="Vrinda"/>
+        <a:font script="Gujr" typeface="Shruti"/>
+        <a:font script="Khmr" typeface="DaunPenh"/>
+        <a:font script="Knda" typeface="Tunga"/>
+        <a:font script="Guru" typeface="Raavi"/>
+        <a:font script="Cans" typeface="Euphemia"/>
+        <a:font script="Cher" typeface="Plantagenet Cherokee"/>
+        <a:font script="Yiii" typeface="Microsoft Yi Baiti"/>
+        <a:font script="Tibt" typeface="Microsoft Himalaya"/>
+        <a:font script="Thaa" typeface="MV Boli"/>
+        <a:font script="Deva" typeface="Mangal"/>
+        <a:font script="Telu" typeface="Gautami"/>
+        <a:font script="Taml" typeface="Latha"/>
+        <a:font script="Syrc" typeface="Estrangelo Edessa"/>
+        <a:font script="Orya" typeface="Kalinga"/>
+        <a:font script="Mlym" typeface="Kartika"/>
+        <a:font script="Laoo" typeface="DokChampa"/>
+        <a:font script="Sinh" typeface="Iskoola Pota"/>
+        <a:font script="Mong" typeface="Mongolian Baiti"/>
+        <a:font script="Viet" typeface="Arial"/>
+        <a:font script="Uigh" typeface="Microsoft Uighur"/>
+        <a:font script="Geor" typeface="Sylfaen"/>
+      </a:minorFont>
+    </a:fontScheme>
+    <a:fmtScheme name="Office">
+      <a:fillStyleLst>
+        <a:solidFill>
+          <a:schemeClr val="phClr"/>
+        </a:solidFill>
+        <a:gradFill rotWithShape="1">
+          <a:gsLst>
+            <a:gs pos="0">
+              <a:schemeClr val="phClr">
+                <a:lumMod val="110000"/>
+                <a:satMod val="105000"/>
+                <a:tint val="67000"/>
+              </a:schemeClr>
+            </a:gs>
+            <a:gs pos="50000">
+              <a:schemeClr val="phClr">
+                <a:lumMod val="105000"/>
+                <a:satMod val="103000"/>
+                <a:tint val="73000"/>
+              </a:schemeClr>
+            </a:gs>
+            <a:gs pos="100000">
+              <a:schemeClr val="phClr">
+                <a:lumMod val="105000"/>
+                <a:satMod val="109000"/>
+                <a:tint val="81000"/>
+              </a:schemeClr>
+            </a:gs>
+          </a:gsLst>
+          <a:lin ang="5400000" scaled="0"/>
+        </a:gradFill>
+        <a:gradFill rotWithShape="1">
+          <a:gsLst>
+            <a:gs pos="0">
+              <a:schemeClr val="phClr">
+                <a:satMod val="103000"/>
+                <a:lumMod val="102000"/>
+                <a:tint val="94000"/>
+              </a:schemeClr>
+            </a:gs>
+            <a:gs pos="50000">
+              <a:schemeClr val="phClr">
+                <a:satMod val="110000"/>
+                <a:lumMod val="100000"/>
+                <a:shade val="100000"/>
+              </a:schemeClr>
+            </a:gs>
+            <a:gs pos="100000">
+              <a:schemeClr val="phClr">
+                <a:lumMod val="99000"/>
+                <a:satMod val="120000"/>
+                <a:shade val="78000"/>
+              </a:schemeClr>
+            </a:gs>
+          </a:gsLst>
+          <a:lin ang="5400000" scaled="0"/>
+        </a:gradFill>
+      </a:fillStyleLst>
+      <a:lnStyleLst>
+        <a:ln w="6350" cap="flat" cmpd="sng" algn="ctr">
+          <a:solidFill>
+            <a:schemeClr val="phClr"/>
+          </a:solidFill>
+          <a:prstDash val="solid"/>
+          <a:miter lim="800000"/>
+        </a:ln>
+        <a:ln w="12700" cap="flat" cmpd="sng" algn="ctr">
+          <a:solidFill>
+            <a:schemeClr val="phClr"/>
+          </a:solidFill>
+          <a:prstDash val="solid"/>
+          <a:miter lim="800000"/>
+        </a:ln>
+        <a:ln w="19050" cap="flat" cmpd="sng" algn="ctr">
+          <a:solidFill>
+            <a:schemeClr val="phClr"/>
+          </a:solidFill>
+          <a:prstDash val="solid"/>
+          <a:miter lim="800000"/>
+        </a:ln>
+      </a:lnStyleLst>
+      <a:effectStyleLst>
+        <a:effectStyle>
+          <a:effectLst/>
+        </a:effectStyle>
+        <a:effectStyle>
+          <a:effectLst/>
+        </a:effectStyle>
+        <a:effectStyle>
+          <a:effectLst>
+            <a:outerShdw blurRad="57150" dist="19050" dir="5400000" algn="ctr" rotWithShape="0">
+              <a:srgbClr val="000000">
+                <a:alpha val="63000"/>
+              </a:srgbClr>
+            </a:outerShdw>
+          </a:effectLst>
+        </a:effectStyle>
+      </a:effectStyleLst>
+      <a:bgFillStyleLst>
+        <a:solidFill>
+          <a:schemeClr val="phClr"/>
+        </a:solidFill>
+        <a:solidFill>
+          <a:schemeClr val="phClr">
+            <a:tint val="95000"/>
+            <a:satMod val="170000"/>
+          </a:schemeClr>
+        </a:solidFill>
+        <a:gradFill rotWithShape="1">
+          <a:gsLst>
+            <a:gs pos="0">
+              <a:schemeClr val="phClr">
+                <a:tint val="93000"/>
+                <a:satMod val="150000"/>
+                <a:shade val="98000"/>
+                <a:lumMod val="102000"/>
+              </a:schemeClr>
+            </a:gs>
+            <a:gs pos="50000">
+              <a:schemeClr val="phClr">
+                <a:tint val="98000"/>
+                <a:satMod val="130000"/>
+                <a:shade val="90000"/>
+                <a:lumMod val="103000"/>
+              </a:schemeClr>
+            </a:gs>
+            <a:gs pos="100000">
+              <a:schemeClr val="phClr">
+                <a:shade val="63000"/>
+                <a:satMod val="120000"/>
+              </a:schemeClr>
+            </a:gs>
+          </a:gsLst>
+          <a:lin ang="5400000" scaled="0"/>
+        </a:gradFill>
+      </a:bgFillStyleLst>
+    </a:fmtScheme>
+  </a:themeElements>
+  <a:objectDefaults/>
+  <a:extraClrSchemeLst/>
+  <a:extLst>
+    <a:ext uri="{05A4C25C-085E-4340-85A3-A5531E510DB2}">
+      <thm15:themeFamily xmlns:thm15="http://schemas.microsoft.com/office/thememl/2012/main" name="Office Theme" id="{62F939B6-93AF-4DB8-9C6B-D6C7DFDC589F}" vid="{4A3C46E8-61CC-4603-A589-7422A47A8E4A}"/>
+    </a:ext>
+  </a:extLst>
+</a:theme>
 </file>
</xml_diff>